<commit_message>
[^] Fix some photo
</commit_message>
<xml_diff>
--- a/PredictionFeature/V 0.6.pptx
+++ b/PredictionFeature/V 0.6.pptx
@@ -5,26 +5,26 @@
     <p:sldMasterId id="2147483648" r:id="rId1"/>
   </p:sldMasterIdLst>
   <p:sldIdLst>
-    <p:sldId id="256" r:id="rId3"/>
-    <p:sldId id="257" r:id="rId4"/>
-    <p:sldId id="259" r:id="rId5"/>
-    <p:sldId id="261" r:id="rId6"/>
-    <p:sldId id="264" r:id="rId7"/>
-    <p:sldId id="260" r:id="rId8"/>
-    <p:sldId id="263" r:id="rId9"/>
-    <p:sldId id="267" r:id="rId10"/>
-    <p:sldId id="271" r:id="rId11"/>
-    <p:sldId id="293" r:id="rId12"/>
-    <p:sldId id="274" r:id="rId13"/>
-    <p:sldId id="268" r:id="rId14"/>
-    <p:sldId id="266" r:id="rId15"/>
-    <p:sldId id="265" r:id="rId16"/>
-    <p:sldId id="276" r:id="rId17"/>
-    <p:sldId id="269" r:id="rId18"/>
-    <p:sldId id="294" r:id="rId19"/>
-    <p:sldId id="262" r:id="rId20"/>
-    <p:sldId id="279" r:id="rId21"/>
-    <p:sldId id="270" r:id="rId22"/>
+    <p:sldId id="256" r:id="rId2"/>
+    <p:sldId id="257" r:id="rId3"/>
+    <p:sldId id="259" r:id="rId4"/>
+    <p:sldId id="261" r:id="rId5"/>
+    <p:sldId id="264" r:id="rId6"/>
+    <p:sldId id="260" r:id="rId7"/>
+    <p:sldId id="263" r:id="rId8"/>
+    <p:sldId id="267" r:id="rId9"/>
+    <p:sldId id="271" r:id="rId10"/>
+    <p:sldId id="293" r:id="rId11"/>
+    <p:sldId id="274" r:id="rId12"/>
+    <p:sldId id="268" r:id="rId13"/>
+    <p:sldId id="266" r:id="rId14"/>
+    <p:sldId id="265" r:id="rId15"/>
+    <p:sldId id="276" r:id="rId16"/>
+    <p:sldId id="269" r:id="rId17"/>
+    <p:sldId id="294" r:id="rId18"/>
+    <p:sldId id="262" r:id="rId19"/>
+    <p:sldId id="279" r:id="rId20"/>
+    <p:sldId id="270" r:id="rId21"/>
   </p:sldIdLst>
   <p:sldSz cx="12192000" cy="6858000"/>
   <p:notesSz cx="6858000" cy="9144000"/>
@@ -123,6 +123,22 @@
       </a:defRPr>
     </a:lvl9pPr>
   </p:defaultTextStyle>
+  <p:extLst>
+    <p:ext uri="{EFAFB233-063F-42B5-8137-9DF3F51BA10A}">
+      <p15:sldGuideLst xmlns:p15="http://schemas.microsoft.com/office/powerpoint/2012/main">
+        <p15:guide id="1" orient="horz" pos="2160">
+          <p15:clr>
+            <a:srgbClr val="A4A3A4"/>
+          </p15:clr>
+        </p15:guide>
+        <p15:guide id="2" pos="3888">
+          <p15:clr>
+            <a:srgbClr val="A4A3A4"/>
+          </p15:clr>
+        </p15:guide>
+      </p15:sldGuideLst>
+    </p:ext>
+  </p:extLst>
 </p:presentation>
 </file>
 
@@ -171,7 +187,6 @@
               <a:rPr lang="en-US"/>
               <a:t>Click to edit Master title style</a:t>
             </a:r>
-            <a:endParaRPr lang="en-US"/>
           </a:p>
         </p:txBody>
       </p:sp>
@@ -236,7 +251,6 @@
               <a:rPr lang="en-US"/>
               <a:t>Click to edit Master subtitle style</a:t>
             </a:r>
-            <a:endParaRPr lang="en-US"/>
           </a:p>
         </p:txBody>
       </p:sp>
@@ -257,6 +271,7 @@
           <a:p>
             <a:fld id="{3C14F5A0-8891-44F5-B192-8B77F21A1D0E}" type="datetimeFigureOut">
               <a:rPr lang="en-US" smtClean="0"/>
+              <a:t>6/2/2018</a:t>
             </a:fld>
             <a:endParaRPr lang="en-US"/>
           </a:p>
@@ -298,6 +313,7 @@
           <a:p>
             <a:fld id="{A826EBBD-346E-4B7B-B92F-DB6B89F25321}" type="slidenum">
               <a:rPr lang="en-US" smtClean="0"/>
+              <a:t>‹#›</a:t>
             </a:fld>
             <a:endParaRPr lang="en-US"/>
           </a:p>
@@ -345,6 +361,7 @@
           <a:p>
             <a:fld id="{3C14F5A0-8891-44F5-B192-8B77F21A1D0E}" type="datetimeFigureOut">
               <a:rPr lang="en-US" smtClean="0"/>
+              <a:t>6/2/2018</a:t>
             </a:fld>
             <a:endParaRPr lang="en-US"/>
           </a:p>
@@ -386,6 +403,7 @@
           <a:p>
             <a:fld id="{A826EBBD-346E-4B7B-B92F-DB6B89F25321}" type="slidenum">
               <a:rPr lang="en-US" smtClean="0"/>
+              <a:t>‹#›</a:t>
             </a:fld>
             <a:endParaRPr lang="en-US"/>
           </a:p>
@@ -433,6 +451,7 @@
           <a:p>
             <a:fld id="{3C14F5A0-8891-44F5-B192-8B77F21A1D0E}" type="datetimeFigureOut">
               <a:rPr lang="en-US" smtClean="0"/>
+              <a:t>6/2/2018</a:t>
             </a:fld>
             <a:endParaRPr lang="en-US"/>
           </a:p>
@@ -474,6 +493,7 @@
           <a:p>
             <a:fld id="{A826EBBD-346E-4B7B-B92F-DB6B89F25321}" type="slidenum">
               <a:rPr lang="en-US" smtClean="0"/>
+              <a:t>‹#›</a:t>
             </a:fld>
             <a:endParaRPr lang="en-US"/>
           </a:p>
@@ -617,6 +637,7 @@
           <a:p>
             <a:fld id="{3C14F5A0-8891-44F5-B192-8B77F21A1D0E}" type="datetimeFigureOut">
               <a:rPr lang="en-US" smtClean="0"/>
+              <a:t>6/2/2018</a:t>
             </a:fld>
             <a:endParaRPr lang="en-US"/>
           </a:p>
@@ -658,6 +679,7 @@
           <a:p>
             <a:fld id="{A826EBBD-346E-4B7B-B92F-DB6B89F25321}" type="slidenum">
               <a:rPr lang="en-US" smtClean="0"/>
+              <a:t>‹#›</a:t>
             </a:fld>
             <a:endParaRPr lang="en-US"/>
           </a:p>
@@ -775,6 +797,7 @@
           <a:p>
             <a:fld id="{3C14F5A0-8891-44F5-B192-8B77F21A1D0E}" type="datetimeFigureOut">
               <a:rPr lang="en-US" smtClean="0"/>
+              <a:t>6/2/2018</a:t>
             </a:fld>
             <a:endParaRPr lang="en-US"/>
           </a:p>
@@ -816,6 +839,7 @@
           <a:p>
             <a:fld id="{A826EBBD-346E-4B7B-B92F-DB6B89F25321}" type="slidenum">
               <a:rPr lang="en-US" smtClean="0"/>
+              <a:t>‹#›</a:t>
             </a:fld>
             <a:endParaRPr lang="en-US"/>
           </a:p>
@@ -887,6 +911,7 @@
           <a:p>
             <a:fld id="{3C14F5A0-8891-44F5-B192-8B77F21A1D0E}" type="datetimeFigureOut">
               <a:rPr lang="en-US" smtClean="0"/>
+              <a:t>6/2/2018</a:t>
             </a:fld>
             <a:endParaRPr lang="en-US"/>
           </a:p>
@@ -928,6 +953,7 @@
           <a:p>
             <a:fld id="{A826EBBD-346E-4B7B-B92F-DB6B89F25321}" type="slidenum">
               <a:rPr lang="en-US" smtClean="0"/>
+              <a:t>‹#›</a:t>
             </a:fld>
             <a:endParaRPr lang="en-US"/>
           </a:p>
@@ -1023,6 +1049,7 @@
           <a:p>
             <a:fld id="{3C14F5A0-8891-44F5-B192-8B77F21A1D0E}" type="datetimeFigureOut">
               <a:rPr lang="en-US" smtClean="0"/>
+              <a:t>6/2/2018</a:t>
             </a:fld>
             <a:endParaRPr lang="en-US"/>
           </a:p>
@@ -1064,6 +1091,7 @@
           <a:p>
             <a:fld id="{A826EBBD-346E-4B7B-B92F-DB6B89F25321}" type="slidenum">
               <a:rPr lang="en-US" smtClean="0"/>
+              <a:t>‹#›</a:t>
             </a:fld>
             <a:endParaRPr lang="en-US"/>
           </a:p>
@@ -1135,6 +1163,7 @@
           <a:p>
             <a:fld id="{3C14F5A0-8891-44F5-B192-8B77F21A1D0E}" type="datetimeFigureOut">
               <a:rPr lang="en-US" smtClean="0"/>
+              <a:t>6/2/2018</a:t>
             </a:fld>
             <a:endParaRPr lang="en-US"/>
           </a:p>
@@ -1176,6 +1205,7 @@
           <a:p>
             <a:fld id="{A826EBBD-346E-4B7B-B92F-DB6B89F25321}" type="slidenum">
               <a:rPr lang="en-US" smtClean="0"/>
+              <a:t>‹#›</a:t>
             </a:fld>
             <a:endParaRPr lang="en-US"/>
           </a:p>
@@ -1775,6 +1805,7 @@
           <a:p>
             <a:fld id="{3C14F5A0-8891-44F5-B192-8B77F21A1D0E}" type="datetimeFigureOut">
               <a:rPr lang="en-US" smtClean="0"/>
+              <a:t>6/2/2018</a:t>
             </a:fld>
             <a:endParaRPr lang="en-US"/>
           </a:p>
@@ -1816,6 +1847,7 @@
           <a:p>
             <a:fld id="{A826EBBD-346E-4B7B-B92F-DB6B89F25321}" type="slidenum">
               <a:rPr lang="en-US" smtClean="0"/>
+              <a:t>‹#›</a:t>
             </a:fld>
             <a:endParaRPr lang="en-US"/>
           </a:p>
@@ -2127,6 +2159,7 @@
           <a:p>
             <a:fld id="{3C14F5A0-8891-44F5-B192-8B77F21A1D0E}" type="datetimeFigureOut">
               <a:rPr lang="en-US" smtClean="0"/>
+              <a:t>6/2/2018</a:t>
             </a:fld>
             <a:endParaRPr lang="en-US"/>
           </a:p>
@@ -2168,6 +2201,7 @@
           <a:p>
             <a:fld id="{A826EBBD-346E-4B7B-B92F-DB6B89F25321}" type="slidenum">
               <a:rPr lang="en-US" smtClean="0"/>
+              <a:t>‹#›</a:t>
             </a:fld>
             <a:endParaRPr lang="en-US"/>
           </a:p>
@@ -2313,6 +2347,7 @@
           <a:p>
             <a:fld id="{3C14F5A0-8891-44F5-B192-8B77F21A1D0E}" type="datetimeFigureOut">
               <a:rPr lang="en-US" smtClean="0"/>
+              <a:t>6/2/2018</a:t>
             </a:fld>
             <a:endParaRPr lang="en-US"/>
           </a:p>
@@ -2354,6 +2389,7 @@
           <a:p>
             <a:fld id="{A826EBBD-346E-4B7B-B92F-DB6B89F25321}" type="slidenum">
               <a:rPr lang="en-US" smtClean="0"/>
+              <a:t>‹#›</a:t>
             </a:fld>
             <a:endParaRPr lang="en-US"/>
           </a:p>
@@ -2489,7 +2525,6 @@
               <a:rPr lang="en-US"/>
               <a:t>Click to edit Master title style</a:t>
             </a:r>
-            <a:endParaRPr lang="en-US"/>
           </a:p>
         </p:txBody>
       </p:sp>
@@ -2513,7 +2548,6 @@
               <a:rPr lang="en-US"/>
               <a:t>Edit Master text styles</a:t>
             </a:r>
-            <a:endParaRPr lang="en-US"/>
           </a:p>
           <a:p>
             <a:pPr lvl="1"/>
@@ -2521,7 +2555,6 @@
               <a:rPr lang="en-US"/>
               <a:t>Second level</a:t>
             </a:r>
-            <a:endParaRPr lang="en-US"/>
           </a:p>
           <a:p>
             <a:pPr lvl="2"/>
@@ -2529,7 +2562,6 @@
               <a:rPr lang="en-US"/>
               <a:t>Third level</a:t>
             </a:r>
-            <a:endParaRPr lang="en-US"/>
           </a:p>
           <a:p>
             <a:pPr lvl="3"/>
@@ -2537,7 +2569,6 @@
               <a:rPr lang="en-US"/>
               <a:t>Fourth level</a:t>
             </a:r>
-            <a:endParaRPr lang="en-US"/>
           </a:p>
           <a:p>
             <a:pPr lvl="4"/>
@@ -2545,7 +2576,6 @@
               <a:rPr lang="en-US"/>
               <a:t>Fifth level</a:t>
             </a:r>
-            <a:endParaRPr lang="en-US"/>
           </a:p>
         </p:txBody>
       </p:sp>
@@ -2566,6 +2596,7 @@
           <a:p>
             <a:fld id="{3C14F5A0-8891-44F5-B192-8B77F21A1D0E}" type="datetimeFigureOut">
               <a:rPr lang="en-US" smtClean="0"/>
+              <a:t>6/2/2018</a:t>
             </a:fld>
             <a:endParaRPr lang="en-US"/>
           </a:p>
@@ -2607,6 +2638,7 @@
           <a:p>
             <a:fld id="{A826EBBD-346E-4B7B-B92F-DB6B89F25321}" type="slidenum">
               <a:rPr lang="en-US" smtClean="0"/>
+              <a:t>‹#›</a:t>
             </a:fld>
             <a:endParaRPr lang="en-US"/>
           </a:p>
@@ -2654,6 +2686,7 @@
           <a:p>
             <a:fld id="{3C14F5A0-8891-44F5-B192-8B77F21A1D0E}" type="datetimeFigureOut">
               <a:rPr lang="en-US" smtClean="0"/>
+              <a:t>6/2/2018</a:t>
             </a:fld>
             <a:endParaRPr lang="en-US"/>
           </a:p>
@@ -2695,6 +2728,7 @@
           <a:p>
             <a:fld id="{A826EBBD-346E-4B7B-B92F-DB6B89F25321}" type="slidenum">
               <a:rPr lang="en-US" smtClean="0"/>
+              <a:t>‹#›</a:t>
             </a:fld>
             <a:endParaRPr lang="en-US"/>
           </a:p>
@@ -2854,6 +2888,7 @@
           <a:p>
             <a:fld id="{3C14F5A0-8891-44F5-B192-8B77F21A1D0E}" type="datetimeFigureOut">
               <a:rPr lang="en-US" smtClean="0"/>
+              <a:t>6/2/2018</a:t>
             </a:fld>
             <a:endParaRPr lang="en-US"/>
           </a:p>
@@ -2895,6 +2930,7 @@
           <a:p>
             <a:fld id="{A826EBBD-346E-4B7B-B92F-DB6B89F25321}" type="slidenum">
               <a:rPr lang="en-US" smtClean="0"/>
+              <a:t>‹#›</a:t>
             </a:fld>
             <a:endParaRPr lang="en-US"/>
           </a:p>
@@ -3042,6 +3078,7 @@
           <a:p>
             <a:fld id="{3C14F5A0-8891-44F5-B192-8B77F21A1D0E}" type="datetimeFigureOut">
               <a:rPr lang="en-US" smtClean="0"/>
+              <a:t>6/2/2018</a:t>
             </a:fld>
             <a:endParaRPr lang="en-US"/>
           </a:p>
@@ -3083,6 +3120,7 @@
           <a:p>
             <a:fld id="{A826EBBD-346E-4B7B-B92F-DB6B89F25321}" type="slidenum">
               <a:rPr lang="en-US" smtClean="0"/>
+              <a:t>‹#›</a:t>
             </a:fld>
             <a:endParaRPr lang="en-US"/>
           </a:p>
@@ -3154,6 +3192,7 @@
           <a:p>
             <a:fld id="{3C14F5A0-8891-44F5-B192-8B77F21A1D0E}" type="datetimeFigureOut">
               <a:rPr lang="en-US" smtClean="0"/>
+              <a:t>6/2/2018</a:t>
             </a:fld>
             <a:endParaRPr lang="en-US"/>
           </a:p>
@@ -3195,6 +3234,7 @@
           <a:p>
             <a:fld id="{A826EBBD-346E-4B7B-B92F-DB6B89F25321}" type="slidenum">
               <a:rPr lang="en-US" smtClean="0"/>
+              <a:t>‹#›</a:t>
             </a:fld>
             <a:endParaRPr lang="en-US"/>
           </a:p>
@@ -3288,6 +3328,7 @@
           <a:p>
             <a:fld id="{3C14F5A0-8891-44F5-B192-8B77F21A1D0E}" type="datetimeFigureOut">
               <a:rPr lang="en-US" smtClean="0"/>
+              <a:t>6/2/2018</a:t>
             </a:fld>
             <a:endParaRPr lang="en-US"/>
           </a:p>
@@ -3329,6 +3370,7 @@
           <a:p>
             <a:fld id="{A826EBBD-346E-4B7B-B92F-DB6B89F25321}" type="slidenum">
               <a:rPr lang="en-US" smtClean="0"/>
+              <a:t>‹#›</a:t>
             </a:fld>
             <a:endParaRPr lang="en-US"/>
           </a:p>
@@ -3422,6 +3464,7 @@
           <a:p>
             <a:fld id="{3C14F5A0-8891-44F5-B192-8B77F21A1D0E}" type="datetimeFigureOut">
               <a:rPr lang="en-US" smtClean="0"/>
+              <a:t>6/2/2018</a:t>
             </a:fld>
             <a:endParaRPr lang="en-US"/>
           </a:p>
@@ -3463,6 +3506,7 @@
           <a:p>
             <a:fld id="{A826EBBD-346E-4B7B-B92F-DB6B89F25321}" type="slidenum">
               <a:rPr lang="en-US" smtClean="0"/>
+              <a:t>‹#›</a:t>
             </a:fld>
             <a:endParaRPr lang="en-US"/>
           </a:p>
@@ -3908,6 +3952,7 @@
           <a:p>
             <a:fld id="{3C14F5A0-8891-44F5-B192-8B77F21A1D0E}" type="datetimeFigureOut">
               <a:rPr lang="en-US" smtClean="0"/>
+              <a:t>6/2/2018</a:t>
             </a:fld>
             <a:endParaRPr lang="en-US"/>
           </a:p>
@@ -3949,6 +3994,7 @@
           <a:p>
             <a:fld id="{A826EBBD-346E-4B7B-B92F-DB6B89F25321}" type="slidenum">
               <a:rPr lang="en-US" smtClean="0"/>
+              <a:t>‹#›</a:t>
             </a:fld>
             <a:endParaRPr lang="en-US"/>
           </a:p>
@@ -4138,6 +4184,7 @@
           <a:p>
             <a:fld id="{3C14F5A0-8891-44F5-B192-8B77F21A1D0E}" type="datetimeFigureOut">
               <a:rPr lang="en-US" smtClean="0"/>
+              <a:t>6/2/2018</a:t>
             </a:fld>
             <a:endParaRPr lang="en-US"/>
           </a:p>
@@ -4179,6 +4226,7 @@
           <a:p>
             <a:fld id="{A826EBBD-346E-4B7B-B92F-DB6B89F25321}" type="slidenum">
               <a:rPr lang="en-US" smtClean="0"/>
+              <a:t>‹#›</a:t>
             </a:fld>
             <a:endParaRPr lang="en-US"/>
           </a:p>
@@ -4360,6 +4408,7 @@
           <a:p>
             <a:fld id="{3C14F5A0-8891-44F5-B192-8B77F21A1D0E}" type="datetimeFigureOut">
               <a:rPr lang="en-US" smtClean="0"/>
+              <a:t>6/2/2018</a:t>
             </a:fld>
             <a:endParaRPr lang="en-US"/>
           </a:p>
@@ -4401,6 +4450,7 @@
           <a:p>
             <a:fld id="{A826EBBD-346E-4B7B-B92F-DB6B89F25321}" type="slidenum">
               <a:rPr lang="en-US" smtClean="0"/>
+              <a:t>‹#›</a:t>
             </a:fld>
             <a:endParaRPr lang="en-US"/>
           </a:p>
@@ -4572,6 +4622,7 @@
           <a:p>
             <a:fld id="{3C14F5A0-8891-44F5-B192-8B77F21A1D0E}" type="datetimeFigureOut">
               <a:rPr lang="en-US" smtClean="0"/>
+              <a:t>6/2/2018</a:t>
             </a:fld>
             <a:endParaRPr lang="en-US"/>
           </a:p>
@@ -4613,6 +4664,7 @@
           <a:p>
             <a:fld id="{A826EBBD-346E-4B7B-B92F-DB6B89F25321}" type="slidenum">
               <a:rPr lang="en-US" smtClean="0"/>
+              <a:t>‹#›</a:t>
             </a:fld>
             <a:endParaRPr lang="en-US"/>
           </a:p>
@@ -4717,7 +4769,6 @@
               <a:rPr lang="en-US"/>
               <a:t>Click to edit Master title style</a:t>
             </a:r>
-            <a:endParaRPr lang="en-US"/>
           </a:p>
         </p:txBody>
       </p:sp>
@@ -4837,7 +4888,6 @@
               <a:rPr lang="en-US"/>
               <a:t>Edit Master text styles</a:t>
             </a:r>
-            <a:endParaRPr lang="en-US"/>
           </a:p>
         </p:txBody>
       </p:sp>
@@ -4858,6 +4908,7 @@
           <a:p>
             <a:fld id="{3C14F5A0-8891-44F5-B192-8B77F21A1D0E}" type="datetimeFigureOut">
               <a:rPr lang="en-US" smtClean="0"/>
+              <a:t>6/2/2018</a:t>
             </a:fld>
             <a:endParaRPr lang="en-US"/>
           </a:p>
@@ -4899,6 +4950,7 @@
           <a:p>
             <a:fld id="{A826EBBD-346E-4B7B-B92F-DB6B89F25321}" type="slidenum">
               <a:rPr lang="en-US" smtClean="0"/>
+              <a:t>‹#›</a:t>
             </a:fld>
             <a:endParaRPr lang="en-US"/>
           </a:p>
@@ -4946,6 +4998,7 @@
           <a:p>
             <a:fld id="{3C14F5A0-8891-44F5-B192-8B77F21A1D0E}" type="datetimeFigureOut">
               <a:rPr lang="en-US" smtClean="0"/>
+              <a:t>6/2/2018</a:t>
             </a:fld>
             <a:endParaRPr lang="en-US"/>
           </a:p>
@@ -4987,6 +5040,7 @@
           <a:p>
             <a:fld id="{A826EBBD-346E-4B7B-B92F-DB6B89F25321}" type="slidenum">
               <a:rPr lang="en-US" smtClean="0"/>
+              <a:t>‹#›</a:t>
             </a:fld>
             <a:endParaRPr lang="en-US"/>
           </a:p>
@@ -5152,6 +5206,7 @@
           <a:p>
             <a:fld id="{3C14F5A0-8891-44F5-B192-8B77F21A1D0E}" type="datetimeFigureOut">
               <a:rPr lang="en-US" smtClean="0"/>
+              <a:t>6/2/2018</a:t>
             </a:fld>
             <a:endParaRPr lang="en-US"/>
           </a:p>
@@ -5193,6 +5248,7 @@
           <a:p>
             <a:fld id="{A826EBBD-346E-4B7B-B92F-DB6B89F25321}" type="slidenum">
               <a:rPr lang="en-US" smtClean="0"/>
+              <a:t>‹#›</a:t>
             </a:fld>
             <a:endParaRPr lang="en-US"/>
           </a:p>
@@ -5372,7 +5428,6 @@
               <a:rPr lang="en-US"/>
               <a:t>Click to edit Master title style</a:t>
             </a:r>
-            <a:endParaRPr lang="en-US"/>
           </a:p>
         </p:txBody>
       </p:sp>
@@ -5429,7 +5484,6 @@
               <a:rPr lang="en-US"/>
               <a:t>Edit Master text styles</a:t>
             </a:r>
-            <a:endParaRPr lang="en-US"/>
           </a:p>
           <a:p>
             <a:pPr lvl="1"/>
@@ -5437,7 +5491,6 @@
               <a:rPr lang="en-US"/>
               <a:t>Second level</a:t>
             </a:r>
-            <a:endParaRPr lang="en-US"/>
           </a:p>
           <a:p>
             <a:pPr lvl="2"/>
@@ -5445,7 +5498,6 @@
               <a:rPr lang="en-US"/>
               <a:t>Third level</a:t>
             </a:r>
-            <a:endParaRPr lang="en-US"/>
           </a:p>
           <a:p>
             <a:pPr lvl="3"/>
@@ -5453,7 +5505,6 @@
               <a:rPr lang="en-US"/>
               <a:t>Fourth level</a:t>
             </a:r>
-            <a:endParaRPr lang="en-US"/>
           </a:p>
           <a:p>
             <a:pPr lvl="4"/>
@@ -5461,7 +5512,6 @@
               <a:rPr lang="en-US"/>
               <a:t>Fifth level</a:t>
             </a:r>
-            <a:endParaRPr lang="en-US"/>
           </a:p>
         </p:txBody>
       </p:sp>
@@ -5527,7 +5577,6 @@
               <a:rPr lang="en-US"/>
               <a:t>Edit Master text styles</a:t>
             </a:r>
-            <a:endParaRPr lang="en-US"/>
           </a:p>
         </p:txBody>
       </p:sp>
@@ -5548,6 +5597,7 @@
           <a:p>
             <a:fld id="{3C14F5A0-8891-44F5-B192-8B77F21A1D0E}" type="datetimeFigureOut">
               <a:rPr lang="en-US" smtClean="0"/>
+              <a:t>6/2/2018</a:t>
             </a:fld>
             <a:endParaRPr lang="en-US"/>
           </a:p>
@@ -5589,6 +5639,7 @@
           <a:p>
             <a:fld id="{A826EBBD-346E-4B7B-B92F-DB6B89F25321}" type="slidenum">
               <a:rPr lang="en-US" smtClean="0"/>
+              <a:t>‹#›</a:t>
             </a:fld>
             <a:endParaRPr lang="en-US"/>
           </a:p>
@@ -5647,7 +5698,6 @@
               <a:rPr lang="en-US"/>
               <a:t>Click to edit Master title style</a:t>
             </a:r>
-            <a:endParaRPr lang="en-US"/>
           </a:p>
         </p:txBody>
       </p:sp>
@@ -5774,7 +5824,6 @@
               <a:rPr lang="en-US"/>
               <a:t>Edit Master text styles</a:t>
             </a:r>
-            <a:endParaRPr lang="en-US"/>
           </a:p>
         </p:txBody>
       </p:sp>
@@ -5795,6 +5844,7 @@
           <a:p>
             <a:fld id="{3C14F5A0-8891-44F5-B192-8B77F21A1D0E}" type="datetimeFigureOut">
               <a:rPr lang="en-US" smtClean="0"/>
+              <a:t>6/2/2018</a:t>
             </a:fld>
             <a:endParaRPr lang="en-US"/>
           </a:p>
@@ -5836,6 +5886,7 @@
           <a:p>
             <a:fld id="{A826EBBD-346E-4B7B-B92F-DB6B89F25321}" type="slidenum">
               <a:rPr lang="en-US" smtClean="0"/>
+              <a:t>‹#›</a:t>
             </a:fld>
             <a:endParaRPr lang="en-US"/>
           </a:p>
@@ -5885,7 +5936,6 @@
               <a:rPr lang="en-US"/>
               <a:t>Click to edit Master title style</a:t>
             </a:r>
-            <a:endParaRPr lang="en-US"/>
           </a:p>
         </p:txBody>
       </p:sp>
@@ -5909,7 +5959,6 @@
               <a:rPr lang="en-US"/>
               <a:t>Edit Master text styles</a:t>
             </a:r>
-            <a:endParaRPr lang="en-US"/>
           </a:p>
           <a:p>
             <a:pPr lvl="1"/>
@@ -5917,7 +5966,6 @@
               <a:rPr lang="en-US"/>
               <a:t>Second level</a:t>
             </a:r>
-            <a:endParaRPr lang="en-US"/>
           </a:p>
           <a:p>
             <a:pPr lvl="2"/>
@@ -5925,7 +5973,6 @@
               <a:rPr lang="en-US"/>
               <a:t>Third level</a:t>
             </a:r>
-            <a:endParaRPr lang="en-US"/>
           </a:p>
           <a:p>
             <a:pPr lvl="3"/>
@@ -5933,7 +5980,6 @@
               <a:rPr lang="en-US"/>
               <a:t>Fourth level</a:t>
             </a:r>
-            <a:endParaRPr lang="en-US"/>
           </a:p>
           <a:p>
             <a:pPr lvl="4"/>
@@ -5941,7 +5987,6 @@
               <a:rPr lang="en-US"/>
               <a:t>Fifth level</a:t>
             </a:r>
-            <a:endParaRPr lang="en-US"/>
           </a:p>
         </p:txBody>
       </p:sp>
@@ -5962,6 +6007,7 @@
           <a:p>
             <a:fld id="{3C14F5A0-8891-44F5-B192-8B77F21A1D0E}" type="datetimeFigureOut">
               <a:rPr lang="en-US" smtClean="0"/>
+              <a:t>6/2/2018</a:t>
             </a:fld>
             <a:endParaRPr lang="en-US"/>
           </a:p>
@@ -6003,6 +6049,7 @@
           <a:p>
             <a:fld id="{A826EBBD-346E-4B7B-B92F-DB6B89F25321}" type="slidenum">
               <a:rPr lang="en-US" smtClean="0"/>
+              <a:t>‹#›</a:t>
             </a:fld>
             <a:endParaRPr lang="en-US"/>
           </a:p>
@@ -6057,7 +6104,6 @@
               <a:rPr lang="en-US"/>
               <a:t>Click to edit Master title style</a:t>
             </a:r>
-            <a:endParaRPr lang="en-US"/>
           </a:p>
         </p:txBody>
       </p:sp>
@@ -6086,7 +6132,6 @@
               <a:rPr lang="en-US"/>
               <a:t>Edit Master text styles</a:t>
             </a:r>
-            <a:endParaRPr lang="en-US"/>
           </a:p>
           <a:p>
             <a:pPr lvl="1"/>
@@ -6094,7 +6139,6 @@
               <a:rPr lang="en-US"/>
               <a:t>Second level</a:t>
             </a:r>
-            <a:endParaRPr lang="en-US"/>
           </a:p>
           <a:p>
             <a:pPr lvl="2"/>
@@ -6102,7 +6146,6 @@
               <a:rPr lang="en-US"/>
               <a:t>Third level</a:t>
             </a:r>
-            <a:endParaRPr lang="en-US"/>
           </a:p>
           <a:p>
             <a:pPr lvl="3"/>
@@ -6110,7 +6153,6 @@
               <a:rPr lang="en-US"/>
               <a:t>Fourth level</a:t>
             </a:r>
-            <a:endParaRPr lang="en-US"/>
           </a:p>
           <a:p>
             <a:pPr lvl="4"/>
@@ -6118,7 +6160,6 @@
               <a:rPr lang="en-US"/>
               <a:t>Fifth level</a:t>
             </a:r>
-            <a:endParaRPr lang="en-US"/>
           </a:p>
         </p:txBody>
       </p:sp>
@@ -6139,6 +6180,7 @@
           <a:p>
             <a:fld id="{3C14F5A0-8891-44F5-B192-8B77F21A1D0E}" type="datetimeFigureOut">
               <a:rPr lang="en-US" smtClean="0"/>
+              <a:t>6/2/2018</a:t>
             </a:fld>
             <a:endParaRPr lang="en-US"/>
           </a:p>
@@ -6180,6 +6222,7 @@
           <a:p>
             <a:fld id="{A826EBBD-346E-4B7B-B92F-DB6B89F25321}" type="slidenum">
               <a:rPr lang="en-US" smtClean="0"/>
+              <a:t>‹#›</a:t>
             </a:fld>
             <a:endParaRPr lang="en-US"/>
           </a:p>
@@ -6229,7 +6272,6 @@
               <a:rPr lang="en-US"/>
               <a:t>Click to edit Master title style</a:t>
             </a:r>
-            <a:endParaRPr lang="en-US"/>
           </a:p>
         </p:txBody>
       </p:sp>
@@ -6258,7 +6300,6 @@
               <a:rPr lang="en-US"/>
               <a:t>Edit Master text styles</a:t>
             </a:r>
-            <a:endParaRPr lang="en-US"/>
           </a:p>
           <a:p>
             <a:pPr lvl="1"/>
@@ -6266,7 +6307,6 @@
               <a:rPr lang="en-US"/>
               <a:t>Second level</a:t>
             </a:r>
-            <a:endParaRPr lang="en-US"/>
           </a:p>
           <a:p>
             <a:pPr lvl="2"/>
@@ -6274,7 +6314,6 @@
               <a:rPr lang="en-US"/>
               <a:t>Third level</a:t>
             </a:r>
-            <a:endParaRPr lang="en-US"/>
           </a:p>
           <a:p>
             <a:pPr lvl="3"/>
@@ -6282,7 +6321,6 @@
               <a:rPr lang="en-US"/>
               <a:t>Fourth level</a:t>
             </a:r>
-            <a:endParaRPr lang="en-US"/>
           </a:p>
           <a:p>
             <a:pPr lvl="4"/>
@@ -6290,7 +6328,6 @@
               <a:rPr lang="en-US"/>
               <a:t>Fifth level</a:t>
             </a:r>
-            <a:endParaRPr lang="en-US"/>
           </a:p>
         </p:txBody>
       </p:sp>
@@ -6319,7 +6356,6 @@
               <a:rPr lang="en-US"/>
               <a:t>Edit Master text styles</a:t>
             </a:r>
-            <a:endParaRPr lang="en-US"/>
           </a:p>
           <a:p>
             <a:pPr lvl="1"/>
@@ -6327,7 +6363,6 @@
               <a:rPr lang="en-US"/>
               <a:t>Second level</a:t>
             </a:r>
-            <a:endParaRPr lang="en-US"/>
           </a:p>
           <a:p>
             <a:pPr lvl="2"/>
@@ -6335,7 +6370,6 @@
               <a:rPr lang="en-US"/>
               <a:t>Third level</a:t>
             </a:r>
-            <a:endParaRPr lang="en-US"/>
           </a:p>
           <a:p>
             <a:pPr lvl="3"/>
@@ -6343,7 +6377,6 @@
               <a:rPr lang="en-US"/>
               <a:t>Fourth level</a:t>
             </a:r>
-            <a:endParaRPr lang="en-US"/>
           </a:p>
           <a:p>
             <a:pPr lvl="4"/>
@@ -6351,7 +6384,6 @@
               <a:rPr lang="en-US"/>
               <a:t>Fifth level</a:t>
             </a:r>
-            <a:endParaRPr lang="en-US"/>
           </a:p>
         </p:txBody>
       </p:sp>
@@ -6372,6 +6404,7 @@
           <a:p>
             <a:fld id="{3C14F5A0-8891-44F5-B192-8B77F21A1D0E}" type="datetimeFigureOut">
               <a:rPr lang="en-US" smtClean="0"/>
+              <a:t>6/2/2018</a:t>
             </a:fld>
             <a:endParaRPr lang="en-US"/>
           </a:p>
@@ -6413,6 +6446,7 @@
           <a:p>
             <a:fld id="{A826EBBD-346E-4B7B-B92F-DB6B89F25321}" type="slidenum">
               <a:rPr lang="en-US" smtClean="0"/>
+              <a:t>‹#›</a:t>
             </a:fld>
             <a:endParaRPr lang="en-US"/>
           </a:p>
@@ -6467,7 +6501,6 @@
               <a:rPr lang="en-US"/>
               <a:t>Click to edit Master title style</a:t>
             </a:r>
-            <a:endParaRPr lang="en-US"/>
           </a:p>
         </p:txBody>
       </p:sp>
@@ -6533,7 +6566,6 @@
               <a:rPr lang="en-US"/>
               <a:t>Edit Master text styles</a:t>
             </a:r>
-            <a:endParaRPr lang="en-US"/>
           </a:p>
         </p:txBody>
       </p:sp>
@@ -6562,7 +6594,6 @@
               <a:rPr lang="en-US"/>
               <a:t>Edit Master text styles</a:t>
             </a:r>
-            <a:endParaRPr lang="en-US"/>
           </a:p>
           <a:p>
             <a:pPr lvl="1"/>
@@ -6570,7 +6601,6 @@
               <a:rPr lang="en-US"/>
               <a:t>Second level</a:t>
             </a:r>
-            <a:endParaRPr lang="en-US"/>
           </a:p>
           <a:p>
             <a:pPr lvl="2"/>
@@ -6578,7 +6608,6 @@
               <a:rPr lang="en-US"/>
               <a:t>Third level</a:t>
             </a:r>
-            <a:endParaRPr lang="en-US"/>
           </a:p>
           <a:p>
             <a:pPr lvl="3"/>
@@ -6586,7 +6615,6 @@
               <a:rPr lang="en-US"/>
               <a:t>Fourth level</a:t>
             </a:r>
-            <a:endParaRPr lang="en-US"/>
           </a:p>
           <a:p>
             <a:pPr lvl="4"/>
@@ -6594,7 +6622,6 @@
               <a:rPr lang="en-US"/>
               <a:t>Fifth level</a:t>
             </a:r>
-            <a:endParaRPr lang="en-US"/>
           </a:p>
         </p:txBody>
       </p:sp>
@@ -6660,7 +6687,6 @@
               <a:rPr lang="en-US"/>
               <a:t>Edit Master text styles</a:t>
             </a:r>
-            <a:endParaRPr lang="en-US"/>
           </a:p>
         </p:txBody>
       </p:sp>
@@ -6689,7 +6715,6 @@
               <a:rPr lang="en-US"/>
               <a:t>Edit Master text styles</a:t>
             </a:r>
-            <a:endParaRPr lang="en-US"/>
           </a:p>
           <a:p>
             <a:pPr lvl="1"/>
@@ -6697,7 +6722,6 @@
               <a:rPr lang="en-US"/>
               <a:t>Second level</a:t>
             </a:r>
-            <a:endParaRPr lang="en-US"/>
           </a:p>
           <a:p>
             <a:pPr lvl="2"/>
@@ -6705,7 +6729,6 @@
               <a:rPr lang="en-US"/>
               <a:t>Third level</a:t>
             </a:r>
-            <a:endParaRPr lang="en-US"/>
           </a:p>
           <a:p>
             <a:pPr lvl="3"/>
@@ -6713,7 +6736,6 @@
               <a:rPr lang="en-US"/>
               <a:t>Fourth level</a:t>
             </a:r>
-            <a:endParaRPr lang="en-US"/>
           </a:p>
           <a:p>
             <a:pPr lvl="4"/>
@@ -6721,7 +6743,6 @@
               <a:rPr lang="en-US"/>
               <a:t>Fifth level</a:t>
             </a:r>
-            <a:endParaRPr lang="en-US"/>
           </a:p>
         </p:txBody>
       </p:sp>
@@ -6742,6 +6763,7 @@
           <a:p>
             <a:fld id="{3C14F5A0-8891-44F5-B192-8B77F21A1D0E}" type="datetimeFigureOut">
               <a:rPr lang="en-US" smtClean="0"/>
+              <a:t>6/2/2018</a:t>
             </a:fld>
             <a:endParaRPr lang="en-US"/>
           </a:p>
@@ -6783,6 +6805,7 @@
           <a:p>
             <a:fld id="{A826EBBD-346E-4B7B-B92F-DB6B89F25321}" type="slidenum">
               <a:rPr lang="en-US" smtClean="0"/>
+              <a:t>‹#›</a:t>
             </a:fld>
             <a:endParaRPr lang="en-US"/>
           </a:p>
@@ -6832,7 +6855,6 @@
               <a:rPr lang="en-US"/>
               <a:t>Click to edit Master title style</a:t>
             </a:r>
-            <a:endParaRPr lang="en-US"/>
           </a:p>
         </p:txBody>
       </p:sp>
@@ -6853,6 +6875,7 @@
           <a:p>
             <a:fld id="{3C14F5A0-8891-44F5-B192-8B77F21A1D0E}" type="datetimeFigureOut">
               <a:rPr lang="en-US" smtClean="0"/>
+              <a:t>6/2/2018</a:t>
             </a:fld>
             <a:endParaRPr lang="en-US"/>
           </a:p>
@@ -6894,6 +6917,7 @@
           <a:p>
             <a:fld id="{A826EBBD-346E-4B7B-B92F-DB6B89F25321}" type="slidenum">
               <a:rPr lang="en-US" smtClean="0"/>
+              <a:t>‹#›</a:t>
             </a:fld>
             <a:endParaRPr lang="en-US"/>
           </a:p>
@@ -6941,6 +6965,7 @@
           <a:p>
             <a:fld id="{3C14F5A0-8891-44F5-B192-8B77F21A1D0E}" type="datetimeFigureOut">
               <a:rPr lang="en-US" smtClean="0"/>
+              <a:t>6/2/2018</a:t>
             </a:fld>
             <a:endParaRPr lang="en-US"/>
           </a:p>
@@ -6982,6 +7007,7 @@
           <a:p>
             <a:fld id="{A826EBBD-346E-4B7B-B92F-DB6B89F25321}" type="slidenum">
               <a:rPr lang="en-US" smtClean="0"/>
+              <a:t>‹#›</a:t>
             </a:fld>
             <a:endParaRPr lang="en-US"/>
           </a:p>
@@ -7557,6 +7583,7 @@
           <a:p>
             <a:fld id="{3C14F5A0-8891-44F5-B192-8B77F21A1D0E}" type="datetimeFigureOut">
               <a:rPr lang="en-US" smtClean="0"/>
+              <a:t>6/2/2018</a:t>
             </a:fld>
             <a:endParaRPr lang="en-US"/>
           </a:p>
@@ -7598,6 +7625,7 @@
           <a:p>
             <a:fld id="{A826EBBD-346E-4B7B-B92F-DB6B89F25321}" type="slidenum">
               <a:rPr lang="en-US" smtClean="0"/>
+              <a:t>‹#›</a:t>
             </a:fld>
             <a:endParaRPr lang="en-US"/>
           </a:p>
@@ -7645,6 +7673,7 @@
           <a:p>
             <a:fld id="{3C14F5A0-8891-44F5-B192-8B77F21A1D0E}" type="datetimeFigureOut">
               <a:rPr lang="en-US" smtClean="0"/>
+              <a:t>6/2/2018</a:t>
             </a:fld>
             <a:endParaRPr lang="en-US"/>
           </a:p>
@@ -7686,6 +7715,7 @@
           <a:p>
             <a:fld id="{A826EBBD-346E-4B7B-B92F-DB6B89F25321}" type="slidenum">
               <a:rPr lang="en-US" smtClean="0"/>
+              <a:t>‹#›</a:t>
             </a:fld>
             <a:endParaRPr lang="en-US"/>
           </a:p>
@@ -7822,7 +7852,6 @@
               <a:rPr lang="en-US"/>
               <a:t>Click to edit Master title style</a:t>
             </a:r>
-            <a:endParaRPr lang="en-US"/>
           </a:p>
         </p:txBody>
       </p:sp>
@@ -7856,7 +7885,6 @@
               <a:rPr lang="en-US"/>
               <a:t>Edit Master text styles</a:t>
             </a:r>
-            <a:endParaRPr lang="en-US"/>
           </a:p>
           <a:p>
             <a:pPr lvl="1"/>
@@ -7864,7 +7892,6 @@
               <a:rPr lang="en-US"/>
               <a:t>Second level</a:t>
             </a:r>
-            <a:endParaRPr lang="en-US"/>
           </a:p>
           <a:p>
             <a:pPr lvl="2"/>
@@ -7872,7 +7899,6 @@
               <a:rPr lang="en-US"/>
               <a:t>Third level</a:t>
             </a:r>
-            <a:endParaRPr lang="en-US"/>
           </a:p>
           <a:p>
             <a:pPr lvl="3"/>
@@ -7880,7 +7906,6 @@
               <a:rPr lang="en-US"/>
               <a:t>Fourth level</a:t>
             </a:r>
-            <a:endParaRPr lang="en-US"/>
           </a:p>
           <a:p>
             <a:pPr lvl="4"/>
@@ -7888,7 +7913,6 @@
               <a:rPr lang="en-US"/>
               <a:t>Fifth level</a:t>
             </a:r>
-            <a:endParaRPr lang="en-US"/>
           </a:p>
         </p:txBody>
       </p:sp>
@@ -7927,6 +7951,7 @@
           <a:p>
             <a:fld id="{3C14F5A0-8891-44F5-B192-8B77F21A1D0E}" type="datetimeFigureOut">
               <a:rPr lang="en-US" smtClean="0"/>
+              <a:t>6/2/2018</a:t>
             </a:fld>
             <a:endParaRPr lang="en-US"/>
           </a:p>
@@ -8004,6 +8029,7 @@
           <a:p>
             <a:fld id="{A826EBBD-346E-4B7B-B92F-DB6B89F25321}" type="slidenum">
               <a:rPr lang="en-US" smtClean="0"/>
+              <a:t>‹#›</a:t>
             </a:fld>
             <a:endParaRPr lang="en-US"/>
           </a:p>
@@ -8653,6 +8679,7 @@
           <a:bodyPr wrap="square" rtlCol="0">
             <a:spAutoFit/>
           </a:bodyPr>
+          <a:lstStyle/>
           <a:p>
             <a:pPr algn="ctr"/>
             <a:r>
@@ -8665,13 +8692,6 @@
               </a:rPr>
               <a:t>37.1</a:t>
             </a:r>
-            <a:endParaRPr lang="en-US" sz="4800" dirty="0">
-              <a:solidFill>
-                <a:srgbClr val="747F83"/>
-              </a:solidFill>
-              <a:latin typeface="Roboto Medium" panose="02000000000000000000" pitchFamily="2" charset="0"/>
-              <a:ea typeface="Roboto Medium" panose="02000000000000000000" pitchFamily="2" charset="0"/>
-            </a:endParaRPr>
           </a:p>
         </p:txBody>
       </p:sp>
@@ -8708,13 +8728,6 @@
               </a:rPr>
               <a:t>Smart reservoir within e-advertisement app</a:t>
             </a:r>
-            <a:endParaRPr lang="en-US" sz="4800" dirty="0">
-              <a:solidFill>
-                <a:srgbClr val="747F83"/>
-              </a:solidFill>
-              <a:latin typeface="Roboto Medium" panose="02000000000000000000" pitchFamily="2" charset="0"/>
-              <a:ea typeface="Roboto Medium" panose="02000000000000000000" pitchFamily="2" charset="0"/>
-            </a:endParaRPr>
           </a:p>
         </p:txBody>
       </p:sp>
@@ -8742,7 +8755,14 @@
         <p:cNvGrpSpPr/>
         <p:nvPr/>
       </p:nvGrpSpPr>
-      <p:grpSpPr/>
+      <p:grpSpPr>
+        <a:xfrm>
+          <a:off x="0" y="0"/>
+          <a:ext cx="0" cy="0"/>
+          <a:chOff x="0" y="0"/>
+          <a:chExt cx="0" cy="0"/>
+        </a:xfrm>
+      </p:grpSpPr>
       <p:sp>
         <p:nvSpPr>
           <p:cNvPr id="16" name="Freeform 7"/>
@@ -8918,13 +8938,6 @@
               </a:rPr>
               <a:t>Idea</a:t>
             </a:r>
-            <a:endParaRPr lang="en-US" sz="4800" dirty="0">
-              <a:solidFill>
-                <a:srgbClr val="747F83"/>
-              </a:solidFill>
-              <a:latin typeface="Roboto Medium" panose="02000000000000000000" pitchFamily="2" charset="0"/>
-              <a:ea typeface="Roboto Medium" panose="02000000000000000000" pitchFamily="2" charset="0"/>
-            </a:endParaRPr>
           </a:p>
         </p:txBody>
       </p:sp>
@@ -8982,6 +8995,7 @@
           <a:bodyPr wrap="square">
             <a:spAutoFit/>
           </a:bodyPr>
+          <a:lstStyle/>
           <a:p>
             <a:pPr algn="ctr">
               <a:lnSpc>
@@ -9002,14 +9016,6 @@
               </a:rPr>
               <a:t>Encrypt communication channel</a:t>
             </a:r>
-            <a:endParaRPr lang="en-US" dirty="0">
-              <a:solidFill>
-                <a:srgbClr val="747F83"/>
-              </a:solidFill>
-              <a:latin typeface="Roboto" panose="02000000000000000000" pitchFamily="2" charset="0"/>
-              <a:ea typeface="Roboto" panose="02000000000000000000" pitchFamily="2" charset="0"/>
-              <a:cs typeface="Times New Roman" panose="02020603050405020304" pitchFamily="18" charset="0"/>
-            </a:endParaRPr>
           </a:p>
         </p:txBody>
       </p:sp>
@@ -9033,6 +9039,7 @@
           <a:bodyPr wrap="square" rtlCol="0">
             <a:spAutoFit/>
           </a:bodyPr>
+          <a:lstStyle/>
           <a:p>
             <a:pPr algn="ctr"/>
             <a:r>
@@ -9045,13 +9052,6 @@
               </a:rPr>
               <a:t>Technologies</a:t>
             </a:r>
-            <a:endParaRPr lang="en-US" sz="4800" dirty="0">
-              <a:solidFill>
-                <a:srgbClr val="747F83"/>
-              </a:solidFill>
-              <a:latin typeface="Roboto Medium" panose="02000000000000000000" pitchFamily="2" charset="0"/>
-              <a:ea typeface="Roboto Medium" panose="02000000000000000000" pitchFamily="2" charset="0"/>
-            </a:endParaRPr>
           </a:p>
         </p:txBody>
       </p:sp>
@@ -9069,12 +9069,12 @@
           <a:graphicData uri="http://schemas.openxmlformats.org/presentationml/2006/ole">
             <mc:AlternateContent xmlns:mc="http://schemas.openxmlformats.org/markup-compatibility/2006">
               <mc:Choice xmlns:v="urn:schemas-microsoft-com:vml" Requires="v">
-                <p:oleObj spid="_x0000_s25" name="" r:id="rId1" imgW="5594350" imgH="4542790" progId="Paint.Picture">
+                <p:oleObj spid="_x0000_s3076" r:id="rId3" imgW="5594350" imgH="4542790" progId="Paint.Picture">
                   <p:embed/>
                 </p:oleObj>
               </mc:Choice>
               <mc:Fallback>
-                <p:oleObj name="" r:id="rId1" imgW="5594350" imgH="4542790" progId="Paint.Picture">
+                <p:oleObj r:id="rId3" imgW="5594350" imgH="4542790" progId="Paint.Picture">
                   <p:embed/>
                   <p:pic>
                     <p:nvPicPr>
@@ -9083,7 +9083,7 @@
                       <p:nvPr/>
                     </p:nvPicPr>
                     <p:blipFill>
-                      <a:blip r:embed="rId2"/>
+                      <a:blip r:embed="rId4"/>
                       <a:stretch>
                         <a:fillRect/>
                       </a:stretch>
@@ -9138,7 +9138,7 @@
           <p:nvPr/>
         </p:nvPicPr>
         <p:blipFill>
-          <a:blip r:embed="rId1">
+          <a:blip r:embed="rId2">
             <a:extLst>
               <a:ext uri="{28A0092B-C50C-407E-A947-70E740481C1C}">
                 <a14:useLocalDpi xmlns:a14="http://schemas.microsoft.com/office/drawing/2010/main" val="0"/>
@@ -9191,13 +9191,6 @@
               </a:rPr>
               <a:t>Water level in app</a:t>
             </a:r>
-            <a:endParaRPr lang="en-US" sz="4800" dirty="0">
-              <a:solidFill>
-                <a:srgbClr val="747F83"/>
-              </a:solidFill>
-              <a:latin typeface="Roboto Medium" panose="02000000000000000000" pitchFamily="2" charset="0"/>
-              <a:ea typeface="Roboto Medium" panose="02000000000000000000" pitchFamily="2" charset="0"/>
-            </a:endParaRPr>
           </a:p>
         </p:txBody>
       </p:sp>
@@ -9240,14 +9233,14 @@
         <p:nvPicPr>
           <p:cNvPr id="3" name="Замещающая рамка рисунка 2" descr="photo_2018-05-31_22-17-53"/>
           <p:cNvPicPr>
-            <a:picLocks noChangeAspect="1"/>
+            <a:picLocks noGrp="1" noChangeAspect="1"/>
           </p:cNvPicPr>
           <p:nvPr>
             <p:ph type="pic" sz="quarter" idx="13"/>
           </p:nvPr>
         </p:nvPicPr>
         <p:blipFill>
-          <a:blip r:embed="rId2"/>
+          <a:blip r:embed="rId3"/>
           <a:stretch>
             <a:fillRect/>
           </a:stretch>
@@ -9482,13 +9475,6 @@
               </a:rPr>
               <a:t>For greater productivity,as well as avoiding errors, have been written tests</a:t>
             </a:r>
-            <a:endParaRPr lang="en-US" dirty="0">
-              <a:solidFill>
-                <a:srgbClr val="747F83"/>
-              </a:solidFill>
-              <a:latin typeface="Roboto Medium" panose="02000000000000000000" pitchFamily="2" charset="0"/>
-              <a:ea typeface="Roboto Medium" panose="02000000000000000000" pitchFamily="2" charset="0"/>
-            </a:endParaRPr>
           </a:p>
         </p:txBody>
       </p:sp>
@@ -9525,13 +9511,6 @@
               </a:rPr>
               <a:t>Tests</a:t>
             </a:r>
-            <a:endParaRPr lang="en-US" sz="4800" dirty="0">
-              <a:solidFill>
-                <a:srgbClr val="747F83"/>
-              </a:solidFill>
-              <a:latin typeface="Roboto Medium" panose="02000000000000000000" pitchFamily="2" charset="0"/>
-              <a:ea typeface="Roboto Medium" panose="02000000000000000000" pitchFamily="2" charset="0"/>
-            </a:endParaRPr>
           </a:p>
         </p:txBody>
       </p:sp>
@@ -9574,14 +9553,14 @@
         <p:nvPicPr>
           <p:cNvPr id="5" name="Замещающее содержимое 4"/>
           <p:cNvPicPr>
-            <a:picLocks noChangeAspect="1"/>
+            <a:picLocks noGrp="1" noChangeAspect="1"/>
           </p:cNvPicPr>
           <p:nvPr>
             <p:ph idx="1"/>
           </p:nvPr>
         </p:nvPicPr>
         <p:blipFill>
-          <a:blip r:embed="rId1"/>
+          <a:blip r:embed="rId2"/>
           <a:stretch>
             <a:fillRect/>
           </a:stretch>
@@ -9759,13 +9738,6 @@
               </a:rPr>
               <a:t>NodeMCU</a:t>
             </a:r>
-            <a:endParaRPr lang="en-US" sz="4800" dirty="0">
-              <a:solidFill>
-                <a:srgbClr val="747F83"/>
-              </a:solidFill>
-              <a:latin typeface="Roboto Medium" panose="02000000000000000000" pitchFamily="2" charset="0"/>
-              <a:ea typeface="Roboto Medium" panose="02000000000000000000" pitchFamily="2" charset="0"/>
-            </a:endParaRPr>
           </a:p>
         </p:txBody>
       </p:sp>
@@ -9844,14 +9816,6 @@
               </a:rPr>
               <a:t>To create our project was used NodeMCU microcontroller, so custom firmware war written for this system</a:t>
             </a:r>
-            <a:endParaRPr lang="en-US" dirty="0">
-              <a:solidFill>
-                <a:srgbClr val="747F83"/>
-              </a:solidFill>
-              <a:latin typeface="Roboto" panose="02000000000000000000" pitchFamily="2" charset="0"/>
-              <a:ea typeface="Roboto" panose="02000000000000000000" pitchFamily="2" charset="0"/>
-              <a:cs typeface="Times New Roman" panose="02020603050405020304" pitchFamily="18" charset="0"/>
-            </a:endParaRPr>
           </a:p>
         </p:txBody>
       </p:sp>
@@ -9869,12 +9833,12 @@
           <a:graphicData uri="http://schemas.openxmlformats.org/presentationml/2006/ole">
             <mc:AlternateContent xmlns:mc="http://schemas.openxmlformats.org/markup-compatibility/2006">
               <mc:Choice xmlns:v="urn:schemas-microsoft-com:vml" Requires="v">
-                <p:oleObj spid="_x0000_s10" name="" r:id="rId1" imgW="2773680" imgH="2727960" progId="Paint.Picture">
+                <p:oleObj spid="_x0000_s4100" r:id="rId3" imgW="2773680" imgH="2727960" progId="Paint.Picture">
                   <p:embed/>
                 </p:oleObj>
               </mc:Choice>
               <mc:Fallback>
-                <p:oleObj name="" r:id="rId1" imgW="2773680" imgH="2727960" progId="Paint.Picture">
+                <p:oleObj r:id="rId3" imgW="2773680" imgH="2727960" progId="Paint.Picture">
                   <p:embed/>
                   <p:pic>
                     <p:nvPicPr>
@@ -9883,7 +9847,7 @@
                       <p:nvPr/>
                     </p:nvPicPr>
                     <p:blipFill>
-                      <a:blip r:embed="rId2"/>
+                      <a:blip r:embed="rId4"/>
                       <a:stretch>
                         <a:fillRect/>
                       </a:stretch>
@@ -10126,13 +10090,6 @@
               </a:rPr>
               <a:t>Manage a workload que</a:t>
             </a:r>
-            <a:endParaRPr lang="en-US" sz="2400" dirty="0" err="1">
-              <a:solidFill>
-                <a:srgbClr val="747F83"/>
-              </a:solidFill>
-              <a:latin typeface="Roboto Light" panose="02000000000000000000" pitchFamily="2" charset="0"/>
-              <a:ea typeface="Roboto Light" panose="02000000000000000000" pitchFamily="2" charset="0"/>
-            </a:endParaRPr>
           </a:p>
           <a:p>
             <a:pPr>
@@ -10150,13 +10107,6 @@
               </a:rPr>
               <a:t>Providing reliable storage</a:t>
             </a:r>
-            <a:endParaRPr lang="en-US" sz="2400" dirty="0" err="1">
-              <a:solidFill>
-                <a:srgbClr val="747F83"/>
-              </a:solidFill>
-              <a:latin typeface="Roboto Light" panose="02000000000000000000" pitchFamily="2" charset="0"/>
-              <a:ea typeface="Roboto Light" panose="02000000000000000000" pitchFamily="2" charset="0"/>
-            </a:endParaRPr>
           </a:p>
           <a:p>
             <a:pPr>
@@ -10174,13 +10124,6 @@
               </a:rPr>
               <a:t>Guaranteed message delivery</a:t>
             </a:r>
-            <a:endParaRPr lang="en-US" sz="2400" dirty="0" err="1">
-              <a:solidFill>
-                <a:srgbClr val="747F83"/>
-              </a:solidFill>
-              <a:latin typeface="Roboto Light" panose="02000000000000000000" pitchFamily="2" charset="0"/>
-              <a:ea typeface="Roboto Light" panose="02000000000000000000" pitchFamily="2" charset="0"/>
-            </a:endParaRPr>
           </a:p>
           <a:p>
             <a:pPr>
@@ -10393,13 +10336,6 @@
               </a:rPr>
               <a:t>We used Rabbit MQ to:</a:t>
             </a:r>
-            <a:endParaRPr lang="en-US" sz="3200" dirty="0">
-              <a:solidFill>
-                <a:srgbClr val="747F83"/>
-              </a:solidFill>
-              <a:latin typeface="Roboto Medium" panose="02000000000000000000" pitchFamily="2" charset="0"/>
-              <a:ea typeface="Roboto Medium" panose="02000000000000000000" pitchFamily="2" charset="0"/>
-            </a:endParaRPr>
           </a:p>
         </p:txBody>
       </p:sp>
@@ -10631,13 +10567,6 @@
               </a:rPr>
               <a:t>Message Broker(RabbitMQ)</a:t>
             </a:r>
-            <a:endParaRPr lang="en-US" sz="4800" dirty="0">
-              <a:solidFill>
-                <a:srgbClr val="747F83"/>
-              </a:solidFill>
-              <a:latin typeface="Roboto Medium" panose="02000000000000000000" pitchFamily="2" charset="0"/>
-              <a:ea typeface="Roboto Medium" panose="02000000000000000000" pitchFamily="2" charset="0"/>
-            </a:endParaRPr>
           </a:p>
         </p:txBody>
       </p:sp>
@@ -11084,13 +11013,6 @@
               </a:rPr>
               <a:t>GitHub</a:t>
             </a:r>
-            <a:endParaRPr lang="en-US" sz="4800" dirty="0">
-              <a:solidFill>
-                <a:srgbClr val="747F83"/>
-              </a:solidFill>
-              <a:latin typeface="Roboto Medium" panose="02000000000000000000" pitchFamily="2" charset="0"/>
-              <a:ea typeface="Roboto Medium" panose="02000000000000000000" pitchFamily="2" charset="0"/>
-            </a:endParaRPr>
           </a:p>
         </p:txBody>
       </p:sp>
@@ -11102,7 +11024,7 @@
         </p:nvCxnSpPr>
         <p:spPr>
           <a:xfrm>
-            <a:off x="6960358" y="966532"/>
+            <a:off x="6960358" y="917104"/>
             <a:ext cx="4205002" cy="0"/>
           </a:xfrm>
           <a:prstGeom prst="line">
@@ -11131,24 +11053,22 @@
       </p:cxnSp>
       <p:pic>
         <p:nvPicPr>
-          <p:cNvPr id="2" name="Picture 2"/>
+          <p:cNvPr id="7" name="Рисунок 6"/>
           <p:cNvPicPr>
             <a:picLocks noChangeAspect="1"/>
           </p:cNvPicPr>
-          <p:nvPr>
-            <p:ph idx="1"/>
-          </p:nvPr>
+          <p:nvPr/>
         </p:nvPicPr>
         <p:blipFill>
-          <a:blip r:embed="rId1"/>
+          <a:blip r:embed="rId2"/>
           <a:stretch>
             <a:fillRect/>
           </a:stretch>
         </p:blipFill>
         <p:spPr>
           <a:xfrm>
-            <a:off x="3700780" y="1482725"/>
-            <a:ext cx="8468995" cy="4914900"/>
+            <a:off x="3862087" y="943886"/>
+            <a:ext cx="6893698" cy="5691188"/>
           </a:xfrm>
           <a:prstGeom prst="rect">
             <a:avLst/>
@@ -11213,13 +11133,6 @@
               </a:rPr>
               <a:t>Team progress</a:t>
             </a:r>
-            <a:endParaRPr lang="en-US" sz="4800" dirty="0">
-              <a:solidFill>
-                <a:srgbClr val="747F83"/>
-              </a:solidFill>
-              <a:latin typeface="Roboto Medium" panose="02000000000000000000" pitchFamily="2" charset="0"/>
-              <a:ea typeface="Roboto Medium" panose="02000000000000000000" pitchFamily="2" charset="0"/>
-            </a:endParaRPr>
           </a:p>
         </p:txBody>
       </p:sp>
@@ -11260,24 +11173,22 @@
       </p:cxnSp>
       <p:pic>
         <p:nvPicPr>
-          <p:cNvPr id="4" name="Content Placeholder 3"/>
+          <p:cNvPr id="2" name="Рисунок 1"/>
           <p:cNvPicPr>
             <a:picLocks noChangeAspect="1"/>
           </p:cNvPicPr>
-          <p:nvPr>
-            <p:ph idx="1"/>
-          </p:nvPr>
+          <p:nvPr/>
         </p:nvPicPr>
         <p:blipFill>
-          <a:blip r:embed="rId1"/>
+          <a:blip r:embed="rId2"/>
           <a:stretch>
             <a:fillRect/>
           </a:stretch>
         </p:blipFill>
         <p:spPr>
           <a:xfrm>
-            <a:off x="1953260" y="1767205"/>
-            <a:ext cx="8284845" cy="4351655"/>
+            <a:off x="2967037" y="1285856"/>
+            <a:ext cx="6257925" cy="5114925"/>
           </a:xfrm>
           <a:prstGeom prst="rect">
             <a:avLst/>
@@ -11301,7 +11212,14 @@
         <p:cNvGrpSpPr/>
         <p:nvPr/>
       </p:nvGrpSpPr>
-      <p:grpSpPr/>
+      <p:grpSpPr>
+        <a:xfrm>
+          <a:off x="0" y="0"/>
+          <a:ext cx="0" cy="0"/>
+          <a:chOff x="0" y="0"/>
+          <a:chExt cx="0" cy="0"/>
+        </a:xfrm>
+      </p:grpSpPr>
       <p:sp>
         <p:nvSpPr>
           <p:cNvPr id="18" name="TextBox 17"/>
@@ -11322,6 +11240,7 @@
           <a:bodyPr wrap="square" rtlCol="0">
             <a:spAutoFit/>
           </a:bodyPr>
+          <a:lstStyle/>
           <a:p>
             <a:pPr algn="ctr"/>
             <a:r>
@@ -11334,13 +11253,6 @@
               </a:rPr>
               <a:t>Trello</a:t>
             </a:r>
-            <a:endParaRPr lang="en-US" sz="4800" dirty="0">
-              <a:solidFill>
-                <a:srgbClr val="747F83"/>
-              </a:solidFill>
-              <a:latin typeface="Roboto Medium" panose="02000000000000000000" pitchFamily="2" charset="0"/>
-              <a:ea typeface="Roboto Medium" panose="02000000000000000000" pitchFamily="2" charset="0"/>
-            </a:endParaRPr>
           </a:p>
         </p:txBody>
       </p:sp>
@@ -11383,14 +11295,14 @@
         <p:nvPicPr>
           <p:cNvPr id="8" name="Замещающее содержимое 7"/>
           <p:cNvPicPr>
-            <a:picLocks noChangeAspect="1"/>
+            <a:picLocks noGrp="1" noChangeAspect="1"/>
           </p:cNvPicPr>
           <p:nvPr>
             <p:ph idx="1"/>
           </p:nvPr>
         </p:nvPicPr>
         <p:blipFill>
-          <a:blip r:embed="rId1"/>
+          <a:blip r:embed="rId2"/>
           <a:stretch>
             <a:fillRect/>
           </a:stretch>
@@ -11598,13 +11510,6 @@
               </a:rPr>
               <a:t>Technologies</a:t>
             </a:r>
-            <a:endParaRPr lang="en-US" sz="4800" dirty="0">
-              <a:solidFill>
-                <a:srgbClr val="747F83"/>
-              </a:solidFill>
-              <a:latin typeface="Roboto Medium" panose="02000000000000000000" pitchFamily="2" charset="0"/>
-              <a:ea typeface="Roboto Medium" panose="02000000000000000000" pitchFamily="2" charset="0"/>
-            </a:endParaRPr>
           </a:p>
         </p:txBody>
       </p:sp>
@@ -11838,7 +11743,53 @@
               </a:rPr>
               <a:t>MySQL</a:t>
             </a:r>
-            <a:endParaRPr lang="en-US" altLang="uk-UA" b="1" dirty="0">
+          </a:p>
+          <a:p>
+            <a:pPr algn="l"/>
+            <a:r>
+              <a:rPr lang="en-US" altLang="uk-UA" b="1" dirty="0" smtClean="0">
+                <a:solidFill>
+                  <a:srgbClr val="747F83"/>
+                </a:solidFill>
+                <a:latin typeface="Roboto Medium" panose="02000000000000000000" pitchFamily="2" charset="0"/>
+                <a:ea typeface="Roboto Medium" panose="02000000000000000000" pitchFamily="2" charset="0"/>
+              </a:rPr>
+              <a:t>Jav</a:t>
+            </a:r>
+            <a:r>
+              <a:rPr lang="en-US" altLang="uk-UA" b="1" dirty="0" smtClean="0">
+                <a:solidFill>
+                  <a:srgbClr val="747F83"/>
+                </a:solidFill>
+                <a:latin typeface="Roboto Medium" panose="02000000000000000000" pitchFamily="2" charset="0"/>
+                <a:ea typeface="Roboto Medium" panose="02000000000000000000" pitchFamily="2" charset="0"/>
+              </a:rPr>
+              <a:t>a </a:t>
+            </a:r>
+            <a:r>
+              <a:rPr lang="en-US" altLang="uk-UA" b="1" dirty="0" smtClean="0">
+                <a:solidFill>
+                  <a:srgbClr val="747F83"/>
+                </a:solidFill>
+                <a:latin typeface="Roboto Medium" panose="02000000000000000000" pitchFamily="2" charset="0"/>
+                <a:ea typeface="Roboto Medium" panose="02000000000000000000" pitchFamily="2" charset="0"/>
+              </a:rPr>
+              <a:t>Android </a:t>
+            </a:r>
+          </a:p>
+          <a:p>
+            <a:pPr algn="l"/>
+            <a:r>
+              <a:rPr lang="en-US" altLang="uk-UA" b="1" dirty="0" smtClean="0">
+                <a:solidFill>
+                  <a:srgbClr val="747F83"/>
+                </a:solidFill>
+                <a:latin typeface="Roboto Medium" panose="02000000000000000000" pitchFamily="2" charset="0"/>
+                <a:ea typeface="Roboto Medium" panose="02000000000000000000" pitchFamily="2" charset="0"/>
+              </a:rPr>
+              <a:t>Retrofit 2</a:t>
+            </a:r>
+            <a:endParaRPr lang="en-US" altLang="uk-UA" b="1" dirty="0" smtClean="0">
               <a:solidFill>
                 <a:srgbClr val="747F83"/>
               </a:solidFill>
@@ -11849,27 +11800,7 @@
           <a:p>
             <a:pPr algn="l"/>
             <a:r>
-              <a:rPr lang="en-US" altLang="uk-UA" b="1" dirty="0">
-                <a:solidFill>
-                  <a:srgbClr val="747F83"/>
-                </a:solidFill>
-                <a:latin typeface="Roboto Medium" panose="02000000000000000000" pitchFamily="2" charset="0"/>
-                <a:ea typeface="Roboto Medium" panose="02000000000000000000" pitchFamily="2" charset="0"/>
-              </a:rPr>
-              <a:t>Android Studio</a:t>
-            </a:r>
-            <a:endParaRPr lang="en-US" altLang="uk-UA" b="1" dirty="0">
-              <a:solidFill>
-                <a:srgbClr val="747F83"/>
-              </a:solidFill>
-              <a:latin typeface="Roboto Medium" panose="02000000000000000000" pitchFamily="2" charset="0"/>
-              <a:ea typeface="Roboto Medium" panose="02000000000000000000" pitchFamily="2" charset="0"/>
-            </a:endParaRPr>
-          </a:p>
-          <a:p>
-            <a:pPr algn="l"/>
-            <a:r>
-              <a:rPr lang="en-US" altLang="uk-UA" b="1" dirty="0">
+              <a:rPr lang="en-US" altLang="uk-UA" b="1" dirty="0" smtClean="0">
                 <a:solidFill>
                   <a:srgbClr val="747F83"/>
                 </a:solidFill>
@@ -11898,13 +11829,6 @@
               </a:rPr>
               <a:t>PyTest</a:t>
             </a:r>
-            <a:endParaRPr lang="en-US" altLang="uk-UA" b="1" dirty="0">
-              <a:solidFill>
-                <a:srgbClr val="747F83"/>
-              </a:solidFill>
-              <a:latin typeface="Roboto Medium" panose="02000000000000000000" pitchFamily="2" charset="0"/>
-              <a:ea typeface="Roboto Medium" panose="02000000000000000000" pitchFamily="2" charset="0"/>
-            </a:endParaRPr>
           </a:p>
           <a:p>
             <a:pPr algn="l"/>
@@ -11918,13 +11842,6 @@
               </a:rPr>
               <a:t>RabbitMQ</a:t>
             </a:r>
-            <a:endParaRPr lang="en-US" altLang="uk-UA" b="1" dirty="0">
-              <a:solidFill>
-                <a:srgbClr val="747F83"/>
-              </a:solidFill>
-              <a:latin typeface="Roboto Medium" panose="02000000000000000000" pitchFamily="2" charset="0"/>
-              <a:ea typeface="Roboto Medium" panose="02000000000000000000" pitchFamily="2" charset="0"/>
-            </a:endParaRPr>
           </a:p>
           <a:p>
             <a:pPr algn="l"/>
@@ -11938,13 +11855,6 @@
               </a:rPr>
               <a:t>Python</a:t>
             </a:r>
-            <a:endParaRPr lang="en-US" altLang="uk-UA" b="1" dirty="0">
-              <a:solidFill>
-                <a:srgbClr val="747F83"/>
-              </a:solidFill>
-              <a:latin typeface="Roboto Medium" panose="02000000000000000000" pitchFamily="2" charset="0"/>
-              <a:ea typeface="Roboto Medium" panose="02000000000000000000" pitchFamily="2" charset="0"/>
-            </a:endParaRPr>
           </a:p>
           <a:p>
             <a:pPr algn="l"/>
@@ -11958,43 +11868,12 @@
               </a:rPr>
               <a:t>ArduinoIDE</a:t>
             </a:r>
-            <a:endParaRPr lang="en-US" altLang="uk-UA" b="1" dirty="0">
-              <a:solidFill>
-                <a:srgbClr val="747F83"/>
-              </a:solidFill>
-              <a:latin typeface="Roboto Medium" panose="02000000000000000000" pitchFamily="2" charset="0"/>
-              <a:ea typeface="Roboto Medium" panose="02000000000000000000" pitchFamily="2" charset="0"/>
-            </a:endParaRPr>
           </a:p>
         </p:txBody>
       </p:sp>
       <p:pic>
         <p:nvPicPr>
           <p:cNvPr id="11" name="Изображение 10" descr="IMG_0406.png.pagespeed.ce.k529Ei0W07"/>
-          <p:cNvPicPr>
-            <a:picLocks noChangeAspect="1"/>
-          </p:cNvPicPr>
-          <p:nvPr/>
-        </p:nvPicPr>
-        <p:blipFill>
-          <a:blip r:embed="rId1"/>
-          <a:stretch>
-            <a:fillRect/>
-          </a:stretch>
-        </p:blipFill>
-        <p:spPr>
-          <a:xfrm>
-            <a:off x="6775450" y="546735"/>
-            <a:ext cx="2345690" cy="1223645"/>
-          </a:xfrm>
-          <a:prstGeom prst="rect">
-            <a:avLst/>
-          </a:prstGeom>
-        </p:spPr>
-      </p:pic>
-      <p:pic>
-        <p:nvPicPr>
-          <p:cNvPr id="12" name="Изображение 11" descr="sticker,375x360-bg,ffffff"/>
           <p:cNvPicPr>
             <a:picLocks noChangeAspect="1"/>
           </p:cNvPicPr>
@@ -12008,8 +11887,8 @@
         </p:blipFill>
         <p:spPr>
           <a:xfrm>
-            <a:off x="9747250" y="774065"/>
-            <a:ext cx="1666875" cy="1523365"/>
+            <a:off x="6181920" y="774065"/>
+            <a:ext cx="2660016" cy="1104540"/>
           </a:xfrm>
           <a:prstGeom prst="rect">
             <a:avLst/>
@@ -12018,7 +11897,7 @@
       </p:pic>
       <p:pic>
         <p:nvPicPr>
-          <p:cNvPr id="13" name="Изображение 12" descr="Android_Studio_icon.svg"/>
+          <p:cNvPr id="12" name="Изображение 11" descr="sticker,375x360-bg,ffffff"/>
           <p:cNvPicPr>
             <a:picLocks noChangeAspect="1"/>
           </p:cNvPicPr>
@@ -12032,8 +11911,8 @@
         </p:blipFill>
         <p:spPr>
           <a:xfrm>
-            <a:off x="6461125" y="1937385"/>
-            <a:ext cx="1905000" cy="1905000"/>
+            <a:off x="9747250" y="774065"/>
+            <a:ext cx="1666875" cy="1523365"/>
           </a:xfrm>
           <a:prstGeom prst="rect">
             <a:avLst/>
@@ -12042,7 +11921,7 @@
       </p:pic>
       <p:pic>
         <p:nvPicPr>
-          <p:cNvPr id="14" name="Изображение 13" descr="MySQL-logo-F6FF285A58-seeklogo.com"/>
+          <p:cNvPr id="13" name="Изображение 12" descr="Android_Studio_icon.svg"/>
           <p:cNvPicPr>
             <a:picLocks noChangeAspect="1"/>
           </p:cNvPicPr>
@@ -12056,8 +11935,8 @@
         </p:blipFill>
         <p:spPr>
           <a:xfrm>
-            <a:off x="8902065" y="2941320"/>
-            <a:ext cx="2512060" cy="1485900"/>
+            <a:off x="6461125" y="1937385"/>
+            <a:ext cx="1905000" cy="1905000"/>
           </a:xfrm>
           <a:prstGeom prst="rect">
             <a:avLst/>
@@ -12066,7 +11945,7 @@
       </p:pic>
       <p:pic>
         <p:nvPicPr>
-          <p:cNvPr id="15" name="Изображение 14" descr="python-logo-master-v3-TM"/>
+          <p:cNvPr id="14" name="Изображение 13" descr="MySQL-logo-F6FF285A58-seeklogo.com"/>
           <p:cNvPicPr>
             <a:picLocks noChangeAspect="1"/>
           </p:cNvPicPr>
@@ -12080,8 +11959,8 @@
         </p:blipFill>
         <p:spPr>
           <a:xfrm>
-            <a:off x="6148705" y="4002405"/>
-            <a:ext cx="2530475" cy="1384935"/>
+            <a:off x="9201665" y="2603698"/>
+            <a:ext cx="2512060" cy="1485900"/>
           </a:xfrm>
           <a:prstGeom prst="rect">
             <a:avLst/>
@@ -12104,12 +11983,94 @@
         </p:blipFill>
         <p:spPr>
           <a:xfrm>
-            <a:off x="8902065" y="4899660"/>
-            <a:ext cx="2783205" cy="1564005"/>
+            <a:off x="6775450" y="5312316"/>
+            <a:ext cx="2426215" cy="1363397"/>
           </a:xfrm>
           <a:prstGeom prst="rect">
             <a:avLst/>
           </a:prstGeom>
+        </p:spPr>
+      </p:pic>
+      <p:pic>
+        <p:nvPicPr>
+          <p:cNvPr id="5122" name="Picture 2" descr="Ð ÐµÐ·ÑÐ»ÑÑÐ°Ñ Ð¿Ð¾ÑÑÐºÑ Ð·Ð¾Ð±ÑÐ°Ð¶ÐµÐ½Ñ Ð·Ð° Ð·Ð°Ð¿Ð¸ÑÐ¾Ð¼ &quot;python&quot;"/>
+          <p:cNvPicPr>
+            <a:picLocks noChangeAspect="1" noChangeArrowheads="1"/>
+          </p:cNvPicPr>
+          <p:nvPr/>
+        </p:nvPicPr>
+        <p:blipFill>
+          <a:blip r:embed="rId7" cstate="print">
+            <a:extLst>
+              <a:ext uri="{28A0092B-C50C-407E-A947-70E740481C1C}">
+                <a14:useLocalDpi xmlns:a14="http://schemas.microsoft.com/office/drawing/2010/main" val="0"/>
+              </a:ext>
+            </a:extLst>
+          </a:blip>
+          <a:srcRect/>
+          <a:stretch>
+            <a:fillRect/>
+          </a:stretch>
+        </p:blipFill>
+        <p:spPr bwMode="auto">
+          <a:xfrm>
+            <a:off x="5555520" y="4042216"/>
+            <a:ext cx="3716209" cy="1070269"/>
+          </a:xfrm>
+          <a:prstGeom prst="rect">
+            <a:avLst/>
+          </a:prstGeom>
+          <a:noFill/>
+          <a:extLst>
+            <a:ext uri="{909E8E84-426E-40DD-AFC4-6F175D3DCCD1}">
+              <a14:hiddenFill xmlns:a14="http://schemas.microsoft.com/office/drawing/2010/main">
+                <a:solidFill>
+                  <a:srgbClr val="FFFFFF"/>
+                </a:solidFill>
+              </a14:hiddenFill>
+            </a:ext>
+          </a:extLst>
+        </p:spPr>
+      </p:pic>
+      <p:pic>
+        <p:nvPicPr>
+          <p:cNvPr id="5124" name="Picture 4" descr="Ð ÐµÐ·ÑÐ»ÑÑÐ°Ñ Ð¿Ð¾ÑÑÐºÑ Ð·Ð¾Ð±ÑÐ°Ð¶ÐµÐ½Ñ Ð·Ð° Ð·Ð°Ð¿Ð¸ÑÐ¾Ð¼ &quot;flask python png&quot;"/>
+          <p:cNvPicPr>
+            <a:picLocks noChangeAspect="1" noChangeArrowheads="1"/>
+          </p:cNvPicPr>
+          <p:nvPr/>
+        </p:nvPicPr>
+        <p:blipFill>
+          <a:blip r:embed="rId8">
+            <a:extLst>
+              <a:ext uri="{28A0092B-C50C-407E-A947-70E740481C1C}">
+                <a14:useLocalDpi xmlns:a14="http://schemas.microsoft.com/office/drawing/2010/main" val="0"/>
+              </a:ext>
+            </a:extLst>
+          </a:blip>
+          <a:srcRect/>
+          <a:stretch>
+            <a:fillRect/>
+          </a:stretch>
+        </p:blipFill>
+        <p:spPr bwMode="auto">
+          <a:xfrm>
+            <a:off x="9426126" y="4577350"/>
+            <a:ext cx="2395880" cy="1341693"/>
+          </a:xfrm>
+          <a:prstGeom prst="rect">
+            <a:avLst/>
+          </a:prstGeom>
+          <a:noFill/>
+          <a:extLst>
+            <a:ext uri="{909E8E84-426E-40DD-AFC4-6F175D3DCCD1}">
+              <a14:hiddenFill xmlns:a14="http://schemas.microsoft.com/office/drawing/2010/main">
+                <a:solidFill>
+                  <a:srgbClr val="FFFFFF"/>
+                </a:solidFill>
+              </a14:hiddenFill>
+            </a:ext>
+          </a:extLst>
         </p:spPr>
       </p:pic>
     </p:spTree>
@@ -12170,13 +12131,6 @@
               </a:rPr>
               <a:t>Demo</a:t>
             </a:r>
-            <a:endParaRPr lang="en-US" sz="6600" dirty="0">
-              <a:solidFill>
-                <a:srgbClr val="747F83"/>
-              </a:solidFill>
-              <a:latin typeface="Roboto Medium" panose="02000000000000000000" pitchFamily="2" charset="0"/>
-              <a:ea typeface="Roboto Medium" panose="02000000000000000000" pitchFamily="2" charset="0"/>
-            </a:endParaRPr>
           </a:p>
         </p:txBody>
       </p:sp>
@@ -12466,7 +12420,7 @@
           <p:nvPr/>
         </p:nvPicPr>
         <p:blipFill>
-          <a:blip r:embed="rId1">
+          <a:blip r:embed="rId2" cstate="print">
             <a:extLst>
               <a:ext uri="{28A0092B-C50C-407E-A947-70E740481C1C}">
                 <a14:useLocalDpi xmlns:a14="http://schemas.microsoft.com/office/drawing/2010/main" val="0"/>
@@ -12527,14 +12481,6 @@
               </a:rPr>
               <a:t>Vsevolod Pus`</a:t>
             </a:r>
-            <a:endParaRPr lang="en-US" dirty="0">
-              <a:solidFill>
-                <a:srgbClr val="747F83"/>
-              </a:solidFill>
-              <a:latin typeface="Roboto" panose="02000000000000000000" pitchFamily="2" charset="0"/>
-              <a:ea typeface="Roboto" panose="02000000000000000000" pitchFamily="2" charset="0"/>
-              <a:cs typeface="Times New Roman" panose="02020603050405020304" pitchFamily="18" charset="0"/>
-            </a:endParaRPr>
           </a:p>
         </p:txBody>
       </p:sp>
@@ -12574,13 +12520,6 @@
               </a:rPr>
               <a:t>Team</a:t>
             </a:r>
-            <a:endParaRPr lang="en-US" sz="4800" dirty="0">
-              <a:solidFill>
-                <a:srgbClr val="FFFFFF"/>
-              </a:solidFill>
-              <a:latin typeface="Roboto Medium" panose="02000000000000000000" pitchFamily="2" charset="0"/>
-              <a:ea typeface="Roboto Medium" panose="02000000000000000000" pitchFamily="2" charset="0"/>
-            </a:endParaRPr>
           </a:p>
         </p:txBody>
       </p:sp>
@@ -12638,6 +12577,7 @@
           <a:bodyPr wrap="square">
             <a:spAutoFit/>
           </a:bodyPr>
+          <a:lstStyle/>
           <a:p>
             <a:pPr algn="ctr">
               <a:lnSpc>
@@ -12658,14 +12598,6 @@
               </a:rPr>
               <a:t>Stanislav Melnik</a:t>
             </a:r>
-            <a:endParaRPr lang="en-US" dirty="0">
-              <a:solidFill>
-                <a:srgbClr val="747F83"/>
-              </a:solidFill>
-              <a:latin typeface="Roboto" panose="02000000000000000000" pitchFamily="2" charset="0"/>
-              <a:ea typeface="Roboto" panose="02000000000000000000" pitchFamily="2" charset="0"/>
-              <a:cs typeface="Times New Roman" panose="02020603050405020304" pitchFamily="18" charset="0"/>
-            </a:endParaRPr>
           </a:p>
         </p:txBody>
       </p:sp>
@@ -12772,14 +12704,6 @@
               </a:rPr>
               <a:t>Bogdan Nazar</a:t>
             </a:r>
-            <a:endParaRPr lang="en-US" dirty="0">
-              <a:solidFill>
-                <a:srgbClr val="747F83"/>
-              </a:solidFill>
-              <a:latin typeface="Roboto" panose="02000000000000000000" pitchFamily="2" charset="0"/>
-              <a:ea typeface="Roboto" panose="02000000000000000000" pitchFamily="2" charset="0"/>
-              <a:cs typeface="Times New Roman" panose="02020603050405020304" pitchFamily="18" charset="0"/>
-            </a:endParaRPr>
           </a:p>
         </p:txBody>
       </p:sp>
@@ -12823,14 +12747,6 @@
               </a:rPr>
               <a:t>Roman Veseliak</a:t>
             </a:r>
-            <a:endParaRPr lang="en-US" dirty="0">
-              <a:solidFill>
-                <a:srgbClr val="747F83"/>
-              </a:solidFill>
-              <a:latin typeface="Roboto" panose="02000000000000000000" pitchFamily="2" charset="0"/>
-              <a:ea typeface="Roboto" panose="02000000000000000000" pitchFamily="2" charset="0"/>
-              <a:cs typeface="Times New Roman" panose="02020603050405020304" pitchFamily="18" charset="0"/>
-            </a:endParaRPr>
           </a:p>
         </p:txBody>
       </p:sp>
@@ -12843,7 +12759,7 @@
         <p:spPr>
           <a:xfrm>
             <a:off x="6695650" y="875228"/>
-            <a:ext cx="3891118" cy="387350"/>
+            <a:ext cx="3891118" cy="388696"/>
           </a:xfrm>
           <a:prstGeom prst="rect">
             <a:avLst/>
@@ -12864,7 +12780,7 @@
               </a:spcAft>
             </a:pPr>
             <a:r>
-              <a:rPr lang="en-US" dirty="0">
+              <a:rPr lang="en-US" dirty="0" err="1" smtClean="0">
                 <a:solidFill>
                   <a:srgbClr val="747F83"/>
                 </a:solidFill>
@@ -12872,7 +12788,29 @@
                 <a:ea typeface="Roboto" panose="02000000000000000000" pitchFamily="2" charset="0"/>
                 <a:cs typeface="Times New Roman" panose="02020603050405020304" pitchFamily="18" charset="0"/>
               </a:rPr>
-              <a:t>Volodimir Popovich</a:t>
+              <a:t>Volodymyr</a:t>
+            </a:r>
+            <a:r>
+              <a:rPr lang="en-US" dirty="0" smtClean="0">
+                <a:solidFill>
+                  <a:srgbClr val="747F83"/>
+                </a:solidFill>
+                <a:latin typeface="Roboto" panose="02000000000000000000" pitchFamily="2" charset="0"/>
+                <a:ea typeface="Roboto" panose="02000000000000000000" pitchFamily="2" charset="0"/>
+                <a:cs typeface="Times New Roman" panose="02020603050405020304" pitchFamily="18" charset="0"/>
+              </a:rPr>
+              <a:t> </a:t>
+            </a:r>
+            <a:r>
+              <a:rPr lang="en-US" dirty="0" err="1" smtClean="0">
+                <a:solidFill>
+                  <a:srgbClr val="747F83"/>
+                </a:solidFill>
+                <a:latin typeface="Roboto" panose="02000000000000000000" pitchFamily="2" charset="0"/>
+                <a:ea typeface="Roboto" panose="02000000000000000000" pitchFamily="2" charset="0"/>
+                <a:cs typeface="Times New Roman" panose="02020603050405020304" pitchFamily="18" charset="0"/>
+              </a:rPr>
+              <a:t>Popovych</a:t>
             </a:r>
             <a:endParaRPr lang="en-US" dirty="0">
               <a:solidFill>
@@ -12904,6 +12842,7 @@
           <a:bodyPr wrap="square">
             <a:spAutoFit/>
           </a:bodyPr>
+          <a:lstStyle/>
           <a:p>
             <a:pPr algn="ctr">
               <a:lnSpc>
@@ -12924,14 +12863,6 @@
               </a:rPr>
               <a:t>Mentor</a:t>
             </a:r>
-            <a:endParaRPr lang="en-US" sz="2400" dirty="0">
-              <a:solidFill>
-                <a:srgbClr val="747F83"/>
-              </a:solidFill>
-              <a:latin typeface="Roboto" panose="02000000000000000000" pitchFamily="2" charset="0"/>
-              <a:ea typeface="Roboto" panose="02000000000000000000" pitchFamily="2" charset="0"/>
-              <a:cs typeface="Times New Roman" panose="02020603050405020304" pitchFamily="18" charset="0"/>
-            </a:endParaRPr>
           </a:p>
         </p:txBody>
       </p:sp>
@@ -12975,14 +12906,6 @@
               </a:rPr>
               <a:t>Mykhailo Struchynskyi</a:t>
             </a:r>
-            <a:endParaRPr lang="en-US" dirty="0">
-              <a:solidFill>
-                <a:srgbClr val="747F83"/>
-              </a:solidFill>
-              <a:latin typeface="Roboto" panose="02000000000000000000" pitchFamily="2" charset="0"/>
-              <a:ea typeface="Roboto" panose="02000000000000000000" pitchFamily="2" charset="0"/>
-              <a:cs typeface="Times New Roman" panose="02020603050405020304" pitchFamily="18" charset="0"/>
-            </a:endParaRPr>
           </a:p>
         </p:txBody>
       </p:sp>
@@ -13044,13 +12967,6 @@
               </a:rPr>
               <a:t>Thanks for attention</a:t>
             </a:r>
-            <a:endParaRPr lang="en-US" sz="4800" dirty="0">
-              <a:solidFill>
-                <a:srgbClr val="747F83"/>
-              </a:solidFill>
-              <a:latin typeface="Roboto Medium" panose="02000000000000000000" pitchFamily="2" charset="0"/>
-              <a:ea typeface="Roboto Medium" panose="02000000000000000000" pitchFamily="2" charset="0"/>
-            </a:endParaRPr>
           </a:p>
           <a:p>
             <a:pPr algn="r"/>
@@ -13064,13 +12980,6 @@
               </a:rPr>
               <a:t>     Any question?</a:t>
             </a:r>
-            <a:endParaRPr lang="en-US" sz="4800" dirty="0">
-              <a:solidFill>
-                <a:srgbClr val="747F83"/>
-              </a:solidFill>
-              <a:latin typeface="Roboto Medium" panose="02000000000000000000" pitchFamily="2" charset="0"/>
-              <a:ea typeface="Roboto Medium" panose="02000000000000000000" pitchFamily="2" charset="0"/>
-            </a:endParaRPr>
           </a:p>
         </p:txBody>
       </p:sp>
@@ -13240,13 +13149,6 @@
               </a:rPr>
               <a:t>Project Overview</a:t>
             </a:r>
-            <a:endParaRPr lang="en-US" sz="4800" dirty="0">
-              <a:solidFill>
-                <a:srgbClr val="747F83"/>
-              </a:solidFill>
-              <a:latin typeface="Roboto Medium" panose="02000000000000000000" pitchFamily="2" charset="0"/>
-              <a:ea typeface="Roboto Medium" panose="02000000000000000000" pitchFamily="2" charset="0"/>
-            </a:endParaRPr>
           </a:p>
         </p:txBody>
       </p:sp>
@@ -13325,14 +13227,6 @@
               </a:rPr>
               <a:t>Our service is created to control water level in your bottle within android app</a:t>
             </a:r>
-            <a:endParaRPr lang="en-US" dirty="0">
-              <a:solidFill>
-                <a:srgbClr val="747F83"/>
-              </a:solidFill>
-              <a:latin typeface="Roboto" panose="02000000000000000000" pitchFamily="2" charset="0"/>
-              <a:ea typeface="Roboto" panose="02000000000000000000" pitchFamily="2" charset="0"/>
-              <a:cs typeface="Times New Roman" panose="02020603050405020304" pitchFamily="18" charset="0"/>
-            </a:endParaRPr>
           </a:p>
         </p:txBody>
       </p:sp>
@@ -13340,14 +13234,14 @@
         <p:nvPicPr>
           <p:cNvPr id="2" name="Замещающее содержимое 1" descr="noun_368125_cc"/>
           <p:cNvPicPr>
-            <a:picLocks noChangeAspect="1"/>
+            <a:picLocks noGrp="1" noChangeAspect="1"/>
           </p:cNvPicPr>
           <p:nvPr>
             <p:ph idx="1"/>
           </p:nvPr>
         </p:nvPicPr>
         <p:blipFill>
-          <a:blip r:embed="rId1"/>
+          <a:blip r:embed="rId2"/>
           <a:stretch>
             <a:fillRect/>
           </a:stretch>
@@ -13366,14 +13260,14 @@
         <p:nvPicPr>
           <p:cNvPr id="12" name="Замещающее содержимое 11" descr="noun_368126_cc"/>
           <p:cNvPicPr>
-            <a:picLocks noChangeAspect="1"/>
+            <a:picLocks noGrp="1" noChangeAspect="1"/>
           </p:cNvPicPr>
           <p:nvPr>
             <p:ph sz="half" idx="2"/>
           </p:nvPr>
         </p:nvPicPr>
         <p:blipFill>
-          <a:blip r:embed="rId2"/>
+          <a:blip r:embed="rId3"/>
           <a:stretch>
             <a:fillRect/>
           </a:stretch>
@@ -13397,7 +13291,7 @@
           <p:nvPr/>
         </p:nvPicPr>
         <p:blipFill>
-          <a:blip r:embed="rId3"/>
+          <a:blip r:embed="rId4"/>
           <a:stretch>
             <a:fillRect/>
           </a:stretch>
@@ -13587,13 +13481,6 @@
               </a:rPr>
               <a:t>Data Flow</a:t>
             </a:r>
-            <a:endParaRPr lang="en-US" sz="4800" dirty="0">
-              <a:solidFill>
-                <a:srgbClr val="747F83"/>
-              </a:solidFill>
-              <a:latin typeface="Roboto Medium" panose="02000000000000000000" pitchFamily="2" charset="0"/>
-              <a:ea typeface="Roboto Medium" panose="02000000000000000000" pitchFamily="2" charset="0"/>
-            </a:endParaRPr>
           </a:p>
         </p:txBody>
       </p:sp>
@@ -13636,7 +13523,7 @@
         <p:nvGraphicFramePr>
           <p:cNvPr id="14" name="Замещающее содержимое 13"/>
           <p:cNvGraphicFramePr>
-            <a:graphicFrameLocks noChangeAspect="1"/>
+            <a:graphicFrameLocks noGrp="1" noChangeAspect="1"/>
           </p:cNvGraphicFramePr>
           <p:nvPr>
             <p:ph idx="1"/>
@@ -13650,12 +13537,12 @@
           <a:graphicData uri="http://schemas.openxmlformats.org/presentationml/2006/ole">
             <mc:AlternateContent xmlns:mc="http://schemas.openxmlformats.org/markup-compatibility/2006">
               <mc:Choice xmlns:v="urn:schemas-microsoft-com:vml" Requires="v">
-                <p:oleObj spid="_x0000_s18" name="" r:id="rId1" imgW="8778240" imgH="5364480" progId="Paint.Picture">
+                <p:oleObj spid="_x0000_s1028" r:id="rId3" imgW="8778240" imgH="5364480" progId="Paint.Picture">
                   <p:embed/>
                 </p:oleObj>
               </mc:Choice>
               <mc:Fallback>
-                <p:oleObj name="" r:id="rId1" imgW="8778240" imgH="5364480" progId="Paint.Picture">
+                <p:oleObj r:id="rId3" imgW="8778240" imgH="5364480" progId="Paint.Picture">
                   <p:embed/>
                   <p:pic>
                     <p:nvPicPr>
@@ -13664,7 +13551,7 @@
                       <p:nvPr/>
                     </p:nvPicPr>
                     <p:blipFill>
-                      <a:blip r:embed="rId2"/>
+                      <a:blip r:embed="rId4"/>
                       <a:stretch>
                         <a:fillRect/>
                       </a:stretch>
@@ -13870,13 +13757,6 @@
               </a:rPr>
               <a:t>Data Flow</a:t>
             </a:r>
-            <a:endParaRPr lang="en-US" sz="4800" dirty="0">
-              <a:solidFill>
-                <a:srgbClr val="747F83"/>
-              </a:solidFill>
-              <a:latin typeface="Roboto Medium" panose="02000000000000000000" pitchFamily="2" charset="0"/>
-              <a:ea typeface="Roboto Medium" panose="02000000000000000000" pitchFamily="2" charset="0"/>
-            </a:endParaRPr>
           </a:p>
         </p:txBody>
       </p:sp>
@@ -13929,12 +13809,12 @@
           <a:graphicData uri="http://schemas.openxmlformats.org/presentationml/2006/ole">
             <mc:AlternateContent xmlns:mc="http://schemas.openxmlformats.org/markup-compatibility/2006">
               <mc:Choice xmlns:v="urn:schemas-microsoft-com:vml" Requires="v">
-                <p:oleObj spid="_x0000_s13" name="" r:id="rId1" imgW="11269980" imgH="4937760" progId="Paint.Picture">
+                <p:oleObj spid="_x0000_s2052" r:id="rId3" imgW="11269980" imgH="4937760" progId="Paint.Picture">
                   <p:embed/>
                 </p:oleObj>
               </mc:Choice>
               <mc:Fallback>
-                <p:oleObj name="" r:id="rId1" imgW="11269980" imgH="4937760" progId="Paint.Picture">
+                <p:oleObj r:id="rId3" imgW="11269980" imgH="4937760" progId="Paint.Picture">
                   <p:embed/>
                   <p:pic>
                     <p:nvPicPr>
@@ -13943,7 +13823,7 @@
                       <p:nvPr/>
                     </p:nvPicPr>
                     <p:blipFill>
-                      <a:blip r:embed="rId2"/>
+                      <a:blip r:embed="rId4"/>
                       <a:stretch>
                         <a:fillRect/>
                       </a:stretch>
@@ -14138,13 +14018,6 @@
               </a:rPr>
               <a:t>How does it work?</a:t>
             </a:r>
-            <a:endParaRPr lang="en-US" sz="4800" dirty="0">
-              <a:solidFill>
-                <a:srgbClr val="747F83"/>
-              </a:solidFill>
-              <a:latin typeface="Roboto Medium" panose="02000000000000000000" pitchFamily="2" charset="0"/>
-              <a:ea typeface="Roboto Medium" panose="02000000000000000000" pitchFamily="2" charset="0"/>
-            </a:endParaRPr>
           </a:p>
         </p:txBody>
       </p:sp>
@@ -14203,6 +14076,7 @@
           <a:bodyPr wrap="square" rtlCol="0">
             <a:spAutoFit/>
           </a:bodyPr>
+          <a:lstStyle/>
           <a:p>
             <a:pPr algn="r"/>
             <a:r>
@@ -14215,13 +14089,6 @@
               </a:rPr>
               <a:t>We`ve got conductivity sensors made of 4 wires(1 for earthing and 3 for levels) attached to the wooden bar and placed inside the reservoir. To activate sensors at least one of level wires must be in water with the earthing wire and then NodeMCU changes its status depending on the number of level wires.</a:t>
             </a:r>
-            <a:endParaRPr lang="en-US" altLang="ru-RU" sz="2800" dirty="0">
-              <a:solidFill>
-                <a:srgbClr val="747F83"/>
-              </a:solidFill>
-              <a:latin typeface="Roboto Medium" panose="02000000000000000000" pitchFamily="2" charset="0"/>
-              <a:ea typeface="Roboto Medium" panose="02000000000000000000" pitchFamily="2" charset="0"/>
-            </a:endParaRPr>
           </a:p>
         </p:txBody>
       </p:sp>
@@ -14474,13 +14341,6 @@
               </a:rPr>
               <a:t>Features</a:t>
             </a:r>
-            <a:endParaRPr lang="en-US" sz="4800" dirty="0">
-              <a:solidFill>
-                <a:srgbClr val="747F83"/>
-              </a:solidFill>
-              <a:latin typeface="Roboto Medium" panose="02000000000000000000" pitchFamily="2" charset="0"/>
-              <a:ea typeface="Roboto Medium" panose="02000000000000000000" pitchFamily="2" charset="0"/>
-            </a:endParaRPr>
           </a:p>
         </p:txBody>
       </p:sp>
@@ -14714,13 +14574,6 @@
               </a:rPr>
               <a:t>Future features</a:t>
             </a:r>
-            <a:endParaRPr lang="en-US" b="1" dirty="0">
-              <a:solidFill>
-                <a:srgbClr val="747F83"/>
-              </a:solidFill>
-              <a:latin typeface="Roboto Medium" panose="02000000000000000000" pitchFamily="2" charset="0"/>
-              <a:ea typeface="Roboto Medium" panose="02000000000000000000" pitchFamily="2" charset="0"/>
-            </a:endParaRPr>
           </a:p>
         </p:txBody>
       </p:sp>
@@ -14764,14 +14617,6 @@
               </a:rPr>
               <a:t>Encrypted communication channel</a:t>
             </a:r>
-            <a:endParaRPr lang="en-US" sz="2400" dirty="0">
-              <a:solidFill>
-                <a:srgbClr val="747F83"/>
-              </a:solidFill>
-              <a:latin typeface="Roboto" panose="02000000000000000000" pitchFamily="2" charset="0"/>
-              <a:ea typeface="Roboto" panose="02000000000000000000" pitchFamily="2" charset="0"/>
-              <a:cs typeface="Times New Roman" panose="02020603050405020304" pitchFamily="18" charset="0"/>
-            </a:endParaRPr>
           </a:p>
         </p:txBody>
       </p:sp>
@@ -14815,14 +14660,6 @@
               </a:rPr>
               <a:t>Level change prediction</a:t>
             </a:r>
-            <a:endParaRPr lang="en-US" sz="2400" dirty="0">
-              <a:solidFill>
-                <a:srgbClr val="747F83"/>
-              </a:solidFill>
-              <a:latin typeface="Roboto" panose="02000000000000000000" pitchFamily="2" charset="0"/>
-              <a:ea typeface="Roboto" panose="02000000000000000000" pitchFamily="2" charset="0"/>
-              <a:cs typeface="Times New Roman" panose="02020603050405020304" pitchFamily="18" charset="0"/>
-            </a:endParaRPr>
           </a:p>
         </p:txBody>
       </p:sp>
@@ -14866,14 +14703,6 @@
               </a:rPr>
               <a:t>Refresh level in adroid app</a:t>
             </a:r>
-            <a:endParaRPr lang="en-US" sz="2400" dirty="0">
-              <a:solidFill>
-                <a:srgbClr val="747F83"/>
-              </a:solidFill>
-              <a:latin typeface="Roboto" panose="02000000000000000000" pitchFamily="2" charset="0"/>
-              <a:ea typeface="Roboto" panose="02000000000000000000" pitchFamily="2" charset="0"/>
-              <a:cs typeface="Times New Roman" panose="02020603050405020304" pitchFamily="18" charset="0"/>
-            </a:endParaRPr>
           </a:p>
         </p:txBody>
       </p:sp>
@@ -14896,6 +14725,7 @@
           <a:bodyPr wrap="square">
             <a:spAutoFit/>
           </a:bodyPr>
+          <a:lstStyle/>
           <a:p>
             <a:pPr>
               <a:lnSpc>
@@ -14916,14 +14746,6 @@
               </a:rPr>
               <a:t>Binding user and bottle id via QR code</a:t>
             </a:r>
-            <a:endParaRPr lang="en-US" sz="2400" dirty="0">
-              <a:solidFill>
-                <a:srgbClr val="747F83"/>
-              </a:solidFill>
-              <a:latin typeface="Roboto" panose="02000000000000000000" pitchFamily="2" charset="0"/>
-              <a:ea typeface="Roboto" panose="02000000000000000000" pitchFamily="2" charset="0"/>
-              <a:cs typeface="Times New Roman" panose="02020603050405020304" pitchFamily="18" charset="0"/>
-            </a:endParaRPr>
           </a:p>
         </p:txBody>
       </p:sp>
@@ -14946,6 +14768,7 @@
           <a:bodyPr wrap="square">
             <a:spAutoFit/>
           </a:bodyPr>
+          <a:lstStyle/>
           <a:p>
             <a:pPr>
               <a:lnSpc>
@@ -14966,14 +14789,6 @@
               </a:rPr>
               <a:t>Increase test coverage</a:t>
             </a:r>
-            <a:endParaRPr lang="en-US" sz="2400" dirty="0">
-              <a:solidFill>
-                <a:srgbClr val="747F83"/>
-              </a:solidFill>
-              <a:latin typeface="Roboto" panose="02000000000000000000" pitchFamily="2" charset="0"/>
-              <a:ea typeface="Roboto" panose="02000000000000000000" pitchFamily="2" charset="0"/>
-              <a:cs typeface="Times New Roman" panose="02020603050405020304" pitchFamily="18" charset="0"/>
-            </a:endParaRPr>
           </a:p>
         </p:txBody>
       </p:sp>
@@ -15004,290 +14819,6 @@
       </p:grpSpPr>
       <p:sp>
         <p:nvSpPr>
-          <p:cNvPr id="2" name="Freeform 7"/>
-          <p:cNvSpPr/>
-          <p:nvPr/>
-        </p:nvSpPr>
-        <p:spPr bwMode="auto">
-          <a:xfrm rot="5400000">
-            <a:off x="2391410" y="2668905"/>
-            <a:ext cx="2441575" cy="5247005"/>
-          </a:xfrm>
-          <a:custGeom>
-            <a:avLst/>
-            <a:gdLst>
-              <a:gd name="T0" fmla="*/ 2024 w 4000"/>
-              <a:gd name="T1" fmla="*/ 4000 h 4000"/>
-              <a:gd name="T2" fmla="*/ 3800 w 4000"/>
-              <a:gd name="T3" fmla="*/ 2200 h 4000"/>
-              <a:gd name="T4" fmla="*/ 2000 w 4000"/>
-              <a:gd name="T5" fmla="*/ 400 h 4000"/>
-              <a:gd name="T6" fmla="*/ 200 w 4000"/>
-              <a:gd name="T7" fmla="*/ 2200 h 4000"/>
-              <a:gd name="T8" fmla="*/ 1977 w 4000"/>
-              <a:gd name="T9" fmla="*/ 4000 h 4000"/>
-              <a:gd name="T10" fmla="*/ 0 w 4000"/>
-              <a:gd name="T11" fmla="*/ 2000 h 4000"/>
-              <a:gd name="T12" fmla="*/ 2000 w 4000"/>
-              <a:gd name="T13" fmla="*/ 0 h 4000"/>
-              <a:gd name="T14" fmla="*/ 4000 w 4000"/>
-              <a:gd name="T15" fmla="*/ 2000 h 4000"/>
-              <a:gd name="T16" fmla="*/ 2024 w 4000"/>
-              <a:gd name="T17" fmla="*/ 4000 h 4000"/>
-            </a:gdLst>
-            <a:ahLst/>
-            <a:cxnLst>
-              <a:cxn ang="0">
-                <a:pos x="T0" y="T1"/>
-              </a:cxn>
-              <a:cxn ang="0">
-                <a:pos x="T2" y="T3"/>
-              </a:cxn>
-              <a:cxn ang="0">
-                <a:pos x="T4" y="T5"/>
-              </a:cxn>
-              <a:cxn ang="0">
-                <a:pos x="T6" y="T7"/>
-              </a:cxn>
-              <a:cxn ang="0">
-                <a:pos x="T8" y="T9"/>
-              </a:cxn>
-              <a:cxn ang="0">
-                <a:pos x="T10" y="T11"/>
-              </a:cxn>
-              <a:cxn ang="0">
-                <a:pos x="T12" y="T13"/>
-              </a:cxn>
-              <a:cxn ang="0">
-                <a:pos x="T14" y="T15"/>
-              </a:cxn>
-              <a:cxn ang="0">
-                <a:pos x="T16" y="T17"/>
-              </a:cxn>
-            </a:cxnLst>
-            <a:rect l="0" t="0" r="r" b="b"/>
-            <a:pathLst>
-              <a:path w="4000" h="4000">
-                <a:moveTo>
-                  <a:pt x="2024" y="4000"/>
-                </a:moveTo>
-                <a:cubicBezTo>
-                  <a:pt x="3007" y="3987"/>
-                  <a:pt x="3800" y="3186"/>
-                  <a:pt x="3800" y="2200"/>
-                </a:cubicBezTo>
-                <a:cubicBezTo>
-                  <a:pt x="3800" y="1206"/>
-                  <a:pt x="2994" y="400"/>
-                  <a:pt x="2000" y="400"/>
-                </a:cubicBezTo>
-                <a:cubicBezTo>
-                  <a:pt x="1006" y="400"/>
-                  <a:pt x="200" y="1206"/>
-                  <a:pt x="200" y="2200"/>
-                </a:cubicBezTo>
-                <a:cubicBezTo>
-                  <a:pt x="200" y="3186"/>
-                  <a:pt x="994" y="3987"/>
-                  <a:pt x="1977" y="4000"/>
-                </a:cubicBezTo>
-                <a:cubicBezTo>
-                  <a:pt x="883" y="3987"/>
-                  <a:pt x="0" y="3096"/>
-                  <a:pt x="0" y="2000"/>
-                </a:cubicBezTo>
-                <a:cubicBezTo>
-                  <a:pt x="0" y="895"/>
-                  <a:pt x="896" y="0"/>
-                  <a:pt x="2000" y="0"/>
-                </a:cubicBezTo>
-                <a:cubicBezTo>
-                  <a:pt x="3105" y="0"/>
-                  <a:pt x="4000" y="895"/>
-                  <a:pt x="4000" y="2000"/>
-                </a:cubicBezTo>
-                <a:cubicBezTo>
-                  <a:pt x="4000" y="3096"/>
-                  <a:pt x="3117" y="3987"/>
-                  <a:pt x="2024" y="4000"/>
-                </a:cubicBezTo>
-                <a:close/>
-              </a:path>
-            </a:pathLst>
-          </a:custGeom>
-          <a:gradFill>
-            <a:gsLst>
-              <a:gs pos="65000">
-                <a:srgbClr val="B6AF9D"/>
-              </a:gs>
-              <a:gs pos="30000">
-                <a:srgbClr val="949494"/>
-              </a:gs>
-              <a:gs pos="0">
-                <a:srgbClr val="747F83"/>
-              </a:gs>
-              <a:gs pos="100000">
-                <a:srgbClr val="D6CFB5"/>
-              </a:gs>
-            </a:gsLst>
-            <a:lin ang="1800000" scaled="0"/>
-          </a:gradFill>
-          <a:ln>
-            <a:noFill/>
-          </a:ln>
-        </p:spPr>
-        <p:txBody>
-          <a:bodyPr vert="horz" wrap="square" lIns="91440" tIns="45720" rIns="91440" bIns="45720" numCol="1" anchor="t" anchorCtr="0" compatLnSpc="1"/>
-          <a:lstStyle/>
-          <a:p>
-            <a:endParaRPr lang="en-US" dirty="0"/>
-          </a:p>
-        </p:txBody>
-      </p:sp>
-      <p:sp>
-        <p:nvSpPr>
-          <p:cNvPr id="4" name="Freeform 7"/>
-          <p:cNvSpPr/>
-          <p:nvPr/>
-        </p:nvSpPr>
-        <p:spPr bwMode="auto">
-          <a:xfrm rot="5400000">
-            <a:off x="7891393" y="2669788"/>
-            <a:ext cx="2441575" cy="5245239"/>
-          </a:xfrm>
-          <a:custGeom>
-            <a:avLst/>
-            <a:gdLst>
-              <a:gd name="T0" fmla="*/ 2024 w 4000"/>
-              <a:gd name="T1" fmla="*/ 4000 h 4000"/>
-              <a:gd name="T2" fmla="*/ 3800 w 4000"/>
-              <a:gd name="T3" fmla="*/ 2200 h 4000"/>
-              <a:gd name="T4" fmla="*/ 2000 w 4000"/>
-              <a:gd name="T5" fmla="*/ 400 h 4000"/>
-              <a:gd name="T6" fmla="*/ 200 w 4000"/>
-              <a:gd name="T7" fmla="*/ 2200 h 4000"/>
-              <a:gd name="T8" fmla="*/ 1977 w 4000"/>
-              <a:gd name="T9" fmla="*/ 4000 h 4000"/>
-              <a:gd name="T10" fmla="*/ 0 w 4000"/>
-              <a:gd name="T11" fmla="*/ 2000 h 4000"/>
-              <a:gd name="T12" fmla="*/ 2000 w 4000"/>
-              <a:gd name="T13" fmla="*/ 0 h 4000"/>
-              <a:gd name="T14" fmla="*/ 4000 w 4000"/>
-              <a:gd name="T15" fmla="*/ 2000 h 4000"/>
-              <a:gd name="T16" fmla="*/ 2024 w 4000"/>
-              <a:gd name="T17" fmla="*/ 4000 h 4000"/>
-            </a:gdLst>
-            <a:ahLst/>
-            <a:cxnLst>
-              <a:cxn ang="0">
-                <a:pos x="T0" y="T1"/>
-              </a:cxn>
-              <a:cxn ang="0">
-                <a:pos x="T2" y="T3"/>
-              </a:cxn>
-              <a:cxn ang="0">
-                <a:pos x="T4" y="T5"/>
-              </a:cxn>
-              <a:cxn ang="0">
-                <a:pos x="T6" y="T7"/>
-              </a:cxn>
-              <a:cxn ang="0">
-                <a:pos x="T8" y="T9"/>
-              </a:cxn>
-              <a:cxn ang="0">
-                <a:pos x="T10" y="T11"/>
-              </a:cxn>
-              <a:cxn ang="0">
-                <a:pos x="T12" y="T13"/>
-              </a:cxn>
-              <a:cxn ang="0">
-                <a:pos x="T14" y="T15"/>
-              </a:cxn>
-              <a:cxn ang="0">
-                <a:pos x="T16" y="T17"/>
-              </a:cxn>
-            </a:cxnLst>
-            <a:rect l="0" t="0" r="r" b="b"/>
-            <a:pathLst>
-              <a:path w="4000" h="4000">
-                <a:moveTo>
-                  <a:pt x="2024" y="4000"/>
-                </a:moveTo>
-                <a:cubicBezTo>
-                  <a:pt x="3007" y="3987"/>
-                  <a:pt x="3800" y="3186"/>
-                  <a:pt x="3800" y="2200"/>
-                </a:cubicBezTo>
-                <a:cubicBezTo>
-                  <a:pt x="3800" y="1206"/>
-                  <a:pt x="2994" y="400"/>
-                  <a:pt x="2000" y="400"/>
-                </a:cubicBezTo>
-                <a:cubicBezTo>
-                  <a:pt x="1006" y="400"/>
-                  <a:pt x="200" y="1206"/>
-                  <a:pt x="200" y="2200"/>
-                </a:cubicBezTo>
-                <a:cubicBezTo>
-                  <a:pt x="200" y="3186"/>
-                  <a:pt x="994" y="3987"/>
-                  <a:pt x="1977" y="4000"/>
-                </a:cubicBezTo>
-                <a:cubicBezTo>
-                  <a:pt x="883" y="3987"/>
-                  <a:pt x="0" y="3096"/>
-                  <a:pt x="0" y="2000"/>
-                </a:cubicBezTo>
-                <a:cubicBezTo>
-                  <a:pt x="0" y="895"/>
-                  <a:pt x="896" y="0"/>
-                  <a:pt x="2000" y="0"/>
-                </a:cubicBezTo>
-                <a:cubicBezTo>
-                  <a:pt x="3105" y="0"/>
-                  <a:pt x="4000" y="895"/>
-                  <a:pt x="4000" y="2000"/>
-                </a:cubicBezTo>
-                <a:cubicBezTo>
-                  <a:pt x="4000" y="3096"/>
-                  <a:pt x="3117" y="3987"/>
-                  <a:pt x="2024" y="4000"/>
-                </a:cubicBezTo>
-                <a:close/>
-              </a:path>
-            </a:pathLst>
-          </a:custGeom>
-          <a:gradFill>
-            <a:gsLst>
-              <a:gs pos="65000">
-                <a:srgbClr val="B6AF9D"/>
-              </a:gs>
-              <a:gs pos="30000">
-                <a:srgbClr val="949494"/>
-              </a:gs>
-              <a:gs pos="0">
-                <a:srgbClr val="747F83"/>
-              </a:gs>
-              <a:gs pos="100000">
-                <a:srgbClr val="D6CFB5"/>
-              </a:gs>
-            </a:gsLst>
-            <a:lin ang="1800000" scaled="0"/>
-          </a:gradFill>
-          <a:ln>
-            <a:noFill/>
-          </a:ln>
-        </p:spPr>
-        <p:txBody>
-          <a:bodyPr vert="horz" wrap="square" lIns="91440" tIns="45720" rIns="91440" bIns="45720" numCol="1" anchor="t" anchorCtr="0" compatLnSpc="1"/>
-          <a:lstStyle/>
-          <a:p>
-            <a:endParaRPr lang="en-US" dirty="0"/>
-          </a:p>
-        </p:txBody>
-      </p:sp>
-      <p:sp>
-        <p:nvSpPr>
           <p:cNvPr id="8" name="TextBox 7"/>
           <p:cNvSpPr txBox="1"/>
           <p:nvPr/>
@@ -15319,13 +14850,6 @@
               </a:rPr>
               <a:t>Idea</a:t>
             </a:r>
-            <a:endParaRPr lang="en-US" sz="4800" dirty="0">
-              <a:solidFill>
-                <a:srgbClr val="747F83"/>
-              </a:solidFill>
-              <a:latin typeface="Roboto Medium" panose="02000000000000000000" pitchFamily="2" charset="0"/>
-              <a:ea typeface="Roboto Medium" panose="02000000000000000000" pitchFamily="2" charset="0"/>
-            </a:endParaRPr>
           </a:p>
         </p:txBody>
       </p:sp>
@@ -15383,6 +14907,7 @@
           <a:bodyPr wrap="square">
             <a:spAutoFit/>
           </a:bodyPr>
+          <a:lstStyle/>
           <a:p>
             <a:pPr algn="ctr">
               <a:lnSpc>
@@ -15403,14 +14928,6 @@
               </a:rPr>
               <a:t>Posibility to refresh current level in android app</a:t>
             </a:r>
-            <a:endParaRPr lang="en-US" dirty="0">
-              <a:solidFill>
-                <a:srgbClr val="747F83"/>
-              </a:solidFill>
-              <a:latin typeface="Roboto" panose="02000000000000000000" pitchFamily="2" charset="0"/>
-              <a:ea typeface="Roboto" panose="02000000000000000000" pitchFamily="2" charset="0"/>
-              <a:cs typeface="Times New Roman" panose="02020603050405020304" pitchFamily="18" charset="0"/>
-            </a:endParaRPr>
           </a:p>
         </p:txBody>
       </p:sp>
@@ -15422,7 +14939,7 @@
         </p:nvSpPr>
         <p:spPr>
           <a:xfrm>
-            <a:off x="3483872" y="3013437"/>
+            <a:off x="3631518" y="2123738"/>
             <a:ext cx="5225526" cy="829945"/>
           </a:xfrm>
           <a:prstGeom prst="rect">
@@ -15434,6 +14951,7 @@
           <a:bodyPr wrap="square" rtlCol="0">
             <a:spAutoFit/>
           </a:bodyPr>
+          <a:lstStyle/>
           <a:p>
             <a:pPr algn="ctr"/>
             <a:r>
@@ -15446,43 +14964,12 @@
               </a:rPr>
               <a:t>Technologies</a:t>
             </a:r>
-            <a:endParaRPr lang="en-US" sz="4800" dirty="0">
-              <a:solidFill>
-                <a:srgbClr val="747F83"/>
-              </a:solidFill>
-              <a:latin typeface="Roboto Medium" panose="02000000000000000000" pitchFamily="2" charset="0"/>
-              <a:ea typeface="Roboto Medium" panose="02000000000000000000" pitchFamily="2" charset="0"/>
-            </a:endParaRPr>
           </a:p>
         </p:txBody>
       </p:sp>
       <p:pic>
         <p:nvPicPr>
           <p:cNvPr id="16" name="Изображение 15" descr="Android_Studio_icon.svg"/>
-          <p:cNvPicPr>
-            <a:picLocks noChangeAspect="1"/>
-          </p:cNvPicPr>
-          <p:nvPr/>
-        </p:nvPicPr>
-        <p:blipFill>
-          <a:blip r:embed="rId1"/>
-          <a:stretch>
-            <a:fillRect/>
-          </a:stretch>
-        </p:blipFill>
-        <p:spPr>
-          <a:xfrm>
-            <a:off x="7649845" y="4340225"/>
-            <a:ext cx="2498725" cy="1905000"/>
-          </a:xfrm>
-          <a:prstGeom prst="rect">
-            <a:avLst/>
-          </a:prstGeom>
-        </p:spPr>
-      </p:pic>
-      <p:pic>
-        <p:nvPicPr>
-          <p:cNvPr id="17" name="Изображение 16" descr="MySQL-logo-F6FF285A58-seeklogo.com"/>
           <p:cNvPicPr>
             <a:picLocks noChangeAspect="1"/>
           </p:cNvPicPr>
@@ -15496,12 +14983,118 @@
         </p:blipFill>
         <p:spPr>
           <a:xfrm>
-            <a:off x="1929130" y="4549140"/>
-            <a:ext cx="2512060" cy="1485900"/>
+            <a:off x="6244281" y="3190047"/>
+            <a:ext cx="1779373" cy="1693711"/>
           </a:xfrm>
           <a:prstGeom prst="rect">
             <a:avLst/>
           </a:prstGeom>
+        </p:spPr>
+      </p:pic>
+      <p:pic>
+        <p:nvPicPr>
+          <p:cNvPr id="17" name="Изображение 16" descr="MySQL-logo-F6FF285A58-seeklogo.com"/>
+          <p:cNvPicPr>
+            <a:picLocks noChangeAspect="1"/>
+          </p:cNvPicPr>
+          <p:nvPr/>
+        </p:nvPicPr>
+        <p:blipFill>
+          <a:blip r:embed="rId3"/>
+          <a:stretch>
+            <a:fillRect/>
+          </a:stretch>
+        </p:blipFill>
+        <p:spPr>
+          <a:xfrm>
+            <a:off x="1390206" y="3158000"/>
+            <a:ext cx="2262757" cy="1338436"/>
+          </a:xfrm>
+          <a:prstGeom prst="rect">
+            <a:avLst/>
+          </a:prstGeom>
+        </p:spPr>
+      </p:pic>
+      <p:pic>
+        <p:nvPicPr>
+          <p:cNvPr id="6146" name="Picture 2" descr="ÐÐ¾Ð²âÑÐ·Ð°Ð½Ðµ Ð·Ð¾Ð±ÑÐ°Ð¶ÐµÐ½Ð½Ñ"/>
+          <p:cNvPicPr>
+            <a:picLocks noChangeAspect="1" noChangeArrowheads="1"/>
+          </p:cNvPicPr>
+          <p:nvPr/>
+        </p:nvPicPr>
+        <p:blipFill>
+          <a:blip r:embed="rId4" cstate="print">
+            <a:extLst>
+              <a:ext uri="{28A0092B-C50C-407E-A947-70E740481C1C}">
+                <a14:useLocalDpi xmlns:a14="http://schemas.microsoft.com/office/drawing/2010/main" val="0"/>
+              </a:ext>
+            </a:extLst>
+          </a:blip>
+          <a:srcRect/>
+          <a:stretch>
+            <a:fillRect/>
+          </a:stretch>
+        </p:blipFill>
+        <p:spPr bwMode="auto">
+          <a:xfrm>
+            <a:off x="8023654" y="5120122"/>
+            <a:ext cx="3125762" cy="1092500"/>
+          </a:xfrm>
+          <a:prstGeom prst="rect">
+            <a:avLst/>
+          </a:prstGeom>
+          <a:noFill/>
+          <a:extLst>
+            <a:ext uri="{909E8E84-426E-40DD-AFC4-6F175D3DCCD1}">
+              <a14:hiddenFill xmlns:a14="http://schemas.microsoft.com/office/drawing/2010/main">
+                <a:solidFill>
+                  <a:srgbClr val="FFFFFF"/>
+                </a:solidFill>
+              </a14:hiddenFill>
+            </a:ext>
+          </a:extLst>
+        </p:spPr>
+      </p:pic>
+      <p:pic>
+        <p:nvPicPr>
+          <p:cNvPr id="6148" name="Picture 4" descr="Ð ÐµÐ·ÑÐ»ÑÑÐ°Ñ Ð¿Ð¾ÑÑÐºÑ Ð·Ð¾Ð±ÑÐ°Ð¶ÐµÐ½Ñ Ð·Ð° Ð·Ð°Ð¿Ð¸ÑÐ¾Ð¼ &quot;flask python&quot;"/>
+          <p:cNvPicPr>
+            <a:picLocks noChangeAspect="1" noChangeArrowheads="1"/>
+          </p:cNvPicPr>
+          <p:nvPr/>
+        </p:nvPicPr>
+        <p:blipFill>
+          <a:blip r:embed="rId5">
+            <a:extLst>
+              <a:ext uri="{28A0092B-C50C-407E-A947-70E740481C1C}">
+                <a14:useLocalDpi xmlns:a14="http://schemas.microsoft.com/office/drawing/2010/main" val="0"/>
+              </a:ext>
+            </a:extLst>
+          </a:blip>
+          <a:srcRect/>
+          <a:stretch>
+            <a:fillRect/>
+          </a:stretch>
+        </p:blipFill>
+        <p:spPr bwMode="auto">
+          <a:xfrm>
+            <a:off x="2774162" y="4795101"/>
+            <a:ext cx="2687524" cy="1505013"/>
+          </a:xfrm>
+          <a:prstGeom prst="rect">
+            <a:avLst/>
+          </a:prstGeom>
+          <a:noFill/>
+          <a:extLst>
+            <a:ext uri="{909E8E84-426E-40DD-AFC4-6F175D3DCCD1}">
+              <a14:hiddenFill xmlns:a14="http://schemas.microsoft.com/office/drawing/2010/main">
+                <a:solidFill>
+                  <a:srgbClr val="FFFFFF"/>
+                </a:solidFill>
+              </a14:hiddenFill>
+            </a:ext>
+          </a:extLst>
         </p:spPr>
       </p:pic>
     </p:spTree>
@@ -15665,6 +15258,7 @@
         </p:spPr>
         <p:txBody>
           <a:bodyPr vert="horz" wrap="square" lIns="91440" tIns="45720" rIns="91440" bIns="45720" numCol="1" anchor="t" anchorCtr="0" compatLnSpc="1"/>
+          <a:lstStyle/>
           <a:p>
             <a:endParaRPr lang="en-US" dirty="0"/>
           </a:p>
@@ -15806,6 +15400,7 @@
         </p:spPr>
         <p:txBody>
           <a:bodyPr vert="horz" wrap="square" lIns="91440" tIns="45720" rIns="91440" bIns="45720" numCol="1" anchor="t" anchorCtr="0" compatLnSpc="1"/>
+          <a:lstStyle/>
           <a:p>
             <a:endParaRPr lang="en-US" dirty="0"/>
           </a:p>
@@ -15831,6 +15426,7 @@
           <a:bodyPr wrap="square" rtlCol="0">
             <a:spAutoFit/>
           </a:bodyPr>
+          <a:lstStyle/>
           <a:p>
             <a:pPr algn="ctr"/>
             <a:r>
@@ -15843,13 +15439,6 @@
               </a:rPr>
               <a:t>Idea</a:t>
             </a:r>
-            <a:endParaRPr lang="en-US" sz="4800" dirty="0">
-              <a:solidFill>
-                <a:srgbClr val="747F83"/>
-              </a:solidFill>
-              <a:latin typeface="Roboto Medium" panose="02000000000000000000" pitchFamily="2" charset="0"/>
-              <a:ea typeface="Roboto Medium" panose="02000000000000000000" pitchFamily="2" charset="0"/>
-            </a:endParaRPr>
           </a:p>
         </p:txBody>
       </p:sp>
@@ -15907,6 +15496,7 @@
           <a:bodyPr wrap="square">
             <a:spAutoFit/>
           </a:bodyPr>
+          <a:lstStyle/>
           <a:p>
             <a:pPr algn="ctr">
               <a:lnSpc>
@@ -15927,14 +15517,6 @@
               </a:rPr>
               <a:t>To predict level change using previous data stored in Data Base</a:t>
             </a:r>
-            <a:endParaRPr lang="en-US" dirty="0">
-              <a:solidFill>
-                <a:srgbClr val="747F83"/>
-              </a:solidFill>
-              <a:latin typeface="Roboto" panose="02000000000000000000" pitchFamily="2" charset="0"/>
-              <a:ea typeface="Roboto" panose="02000000000000000000" pitchFamily="2" charset="0"/>
-              <a:cs typeface="Times New Roman" panose="02020603050405020304" pitchFamily="18" charset="0"/>
-            </a:endParaRPr>
           </a:p>
         </p:txBody>
       </p:sp>
@@ -15947,32 +15529,6 @@
           <p:nvPr/>
         </p:nvPicPr>
         <p:blipFill>
-          <a:blip r:embed="rId1"/>
-          <a:stretch>
-            <a:fillRect/>
-          </a:stretch>
-        </p:blipFill>
-        <p:spPr>
-          <a:xfrm>
-            <a:off x="1289050" y="4697095"/>
-            <a:ext cx="4063365" cy="1190625"/>
-          </a:xfrm>
-          <a:prstGeom prst="rect">
-            <a:avLst/>
-          </a:prstGeom>
-        </p:spPr>
-      </p:pic>
-      <p:pic>
-        <p:nvPicPr>
-          <p:cNvPr id="26" name="Content Placeholder 4"/>
-          <p:cNvPicPr>
-            <a:picLocks noChangeAspect="1"/>
-          </p:cNvPicPr>
-          <p:nvPr>
-            <p:ph sz="half" idx="2"/>
-          </p:nvPr>
-        </p:nvPicPr>
-        <p:blipFill>
           <a:blip r:embed="rId2"/>
           <a:stretch>
             <a:fillRect/>
@@ -15980,6 +15536,32 @@
         </p:blipFill>
         <p:spPr>
           <a:xfrm>
+            <a:off x="1289050" y="4697095"/>
+            <a:ext cx="4063365" cy="1190625"/>
+          </a:xfrm>
+          <a:prstGeom prst="rect">
+            <a:avLst/>
+          </a:prstGeom>
+        </p:spPr>
+      </p:pic>
+      <p:pic>
+        <p:nvPicPr>
+          <p:cNvPr id="26" name="Content Placeholder 4"/>
+          <p:cNvPicPr>
+            <a:picLocks noGrp="1" noChangeAspect="1"/>
+          </p:cNvPicPr>
+          <p:nvPr>
+            <p:ph sz="half" idx="2"/>
+          </p:nvPr>
+        </p:nvPicPr>
+        <p:blipFill>
+          <a:blip r:embed="rId3"/>
+          <a:stretch>
+            <a:fillRect/>
+          </a:stretch>
+        </p:blipFill>
+        <p:spPr>
+          <a:xfrm>
             <a:off x="6790055" y="4735195"/>
             <a:ext cx="4010025" cy="1113790"/>
           </a:xfrm>
@@ -16008,6 +15590,7 @@
           <a:bodyPr wrap="square" rtlCol="0">
             <a:spAutoFit/>
           </a:bodyPr>
+          <a:lstStyle/>
           <a:p>
             <a:pPr algn="ctr"/>
             <a:r>
@@ -16020,13 +15603,6 @@
               </a:rPr>
               <a:t>Technologies</a:t>
             </a:r>
-            <a:endParaRPr lang="en-US" sz="4800" dirty="0">
-              <a:solidFill>
-                <a:srgbClr val="747F83"/>
-              </a:solidFill>
-              <a:latin typeface="Roboto Medium" panose="02000000000000000000" pitchFamily="2" charset="0"/>
-              <a:ea typeface="Roboto Medium" panose="02000000000000000000" pitchFamily="2" charset="0"/>
-            </a:endParaRPr>
           </a:p>
         </p:txBody>
       </p:sp>
@@ -16289,6 +15865,8 @@
       </a:bgFillStyleLst>
     </a:fmtScheme>
   </a:themeElements>
+  <a:objectDefaults/>
+  <a:extraClrSchemeLst/>
   <a:extLst>
     <a:ext uri="{05A4C25C-085E-4340-85A3-A5531E510DB2}">
       <thm15:themeFamily xmlns:thm15="http://schemas.microsoft.com/office/thememl/2012/main" name="Office Theme" id="{62F939B6-93AF-4DB8-9C6B-D6C7DFDC589F}" vid="{4A3C46E8-61CC-4603-A589-7422A47A8E4A}"/>

</xml_diff>